<commit_message>
Con Opcion de solo Reales
</commit_message>
<xml_diff>
--- a/Factibilidad FDBP con QC Rev1 Martin Paura.pptx
+++ b/Factibilidad FDBP con QC Rev1 Martin Paura.pptx
@@ -5,7 +5,7 @@
     <p:sldMasterId id="2147483648" r:id="rId1"/>
   </p:sldMasterIdLst>
   <p:notesMasterIdLst>
-    <p:notesMasterId r:id="rId27"/>
+    <p:notesMasterId r:id="rId29"/>
   </p:notesMasterIdLst>
   <p:sldIdLst>
     <p:sldId id="256" r:id="rId2"/>
@@ -30,9 +30,11 @@
     <p:sldId id="290" r:id="rId21"/>
     <p:sldId id="301" r:id="rId22"/>
     <p:sldId id="302" r:id="rId23"/>
-    <p:sldId id="274" r:id="rId24"/>
-    <p:sldId id="269" r:id="rId25"/>
-    <p:sldId id="270" r:id="rId26"/>
+    <p:sldId id="303" r:id="rId24"/>
+    <p:sldId id="304" r:id="rId25"/>
+    <p:sldId id="274" r:id="rId26"/>
+    <p:sldId id="269" r:id="rId27"/>
+    <p:sldId id="270" r:id="rId28"/>
   </p:sldIdLst>
   <p:sldSz cx="12192000" cy="6858000"/>
   <p:notesSz cx="6858000" cy="9144000"/>
@@ -221,7 +223,7 @@
           <a:p>
             <a:fld id="{8287FCAB-9807-4BAE-ADD9-42A7FB43B845}" type="datetimeFigureOut">
               <a:rPr lang="es-ES" smtClean="0"/>
-              <a:t>09/10/2024</a:t>
+              <a:t>10/10/2024</a:t>
             </a:fld>
             <a:endParaRPr lang="es-ES"/>
           </a:p>
@@ -4133,7 +4135,13 @@
   <p:cSld>
     <p:spTree>
       <p:nvGrpSpPr>
-        <p:cNvPr id="1" name=""/>
+        <p:cNvPr id="1" name="">
+          <a:extLst>
+            <a:ext uri="{FF2B5EF4-FFF2-40B4-BE49-F238E27FC236}">
+              <a16:creationId xmlns:a16="http://schemas.microsoft.com/office/drawing/2014/main" id="{32F85087-7606-3CD6-96B7-968016BD31A8}"/>
+            </a:ext>
+          </a:extLst>
+        </p:cNvPr>
         <p:cNvGrpSpPr/>
         <p:nvPr/>
       </p:nvGrpSpPr>
@@ -4147,7 +4155,13 @@
       </p:grpSpPr>
       <p:sp>
         <p:nvSpPr>
-          <p:cNvPr id="2" name="Marcador de imagen de diapositiva 1"/>
+          <p:cNvPr id="2" name="Marcador de imagen de diapositiva 1">
+            <a:extLst>
+              <a:ext uri="{FF2B5EF4-FFF2-40B4-BE49-F238E27FC236}">
+                <a16:creationId xmlns:a16="http://schemas.microsoft.com/office/drawing/2014/main" id="{D8D38DFA-B885-714C-7533-C7E02A4B9C1F}"/>
+              </a:ext>
+            </a:extLst>
+          </p:cNvPr>
           <p:cNvSpPr>
             <a:spLocks noGrp="1" noRot="1" noChangeAspect="1"/>
           </p:cNvSpPr>
@@ -4159,7 +4173,13 @@
       </p:sp>
       <p:sp>
         <p:nvSpPr>
-          <p:cNvPr id="3" name="Marcador de notas 2"/>
+          <p:cNvPr id="3" name="Marcador de notas 2">
+            <a:extLst>
+              <a:ext uri="{FF2B5EF4-FFF2-40B4-BE49-F238E27FC236}">
+                <a16:creationId xmlns:a16="http://schemas.microsoft.com/office/drawing/2014/main" id="{7F8EBB8A-1D30-BA8B-D15C-AD1D6E87B7CE}"/>
+              </a:ext>
+            </a:extLst>
+          </p:cNvPr>
           <p:cNvSpPr>
             <a:spLocks noGrp="1"/>
           </p:cNvSpPr>
@@ -4172,13 +4192,191 @@
           <a:bodyPr/>
           <a:lstStyle/>
           <a:p>
+            <a:r>
+              <a:rPr lang="en-US" dirty="0"/>
+              <a:t>En un Sistema de radar de </a:t>
+            </a:r>
+            <a:r>
+              <a:rPr lang="en-US" dirty="0" err="1"/>
+              <a:t>apertura</a:t>
+            </a:r>
+            <a:r>
+              <a:rPr lang="en-US" dirty="0"/>
+              <a:t> </a:t>
+            </a:r>
+            <a:r>
+              <a:rPr lang="en-US" dirty="0" err="1"/>
+              <a:t>sintética</a:t>
+            </a:r>
+            <a:r>
+              <a:rPr lang="en-US" dirty="0"/>
+              <a:t> </a:t>
+            </a:r>
+            <a:r>
+              <a:rPr lang="en-US" dirty="0" err="1"/>
+              <a:t>el</a:t>
+            </a:r>
+            <a:r>
+              <a:rPr lang="en-US" dirty="0"/>
+              <a:t> </a:t>
+            </a:r>
+            <a:r>
+              <a:rPr lang="en-US" dirty="0" err="1"/>
+              <a:t>equipo</a:t>
+            </a:r>
+            <a:r>
+              <a:rPr lang="en-US" dirty="0"/>
+              <a:t> </a:t>
+            </a:r>
+            <a:r>
+              <a:rPr lang="en-US" dirty="0" err="1"/>
+              <a:t>va</a:t>
+            </a:r>
+            <a:r>
+              <a:rPr lang="en-US" dirty="0"/>
+              <a:t> </a:t>
+            </a:r>
+            <a:r>
+              <a:rPr lang="en-US" dirty="0" err="1"/>
+              <a:t>emitiendo</a:t>
+            </a:r>
+            <a:r>
+              <a:rPr lang="en-US" dirty="0"/>
+              <a:t> </a:t>
+            </a:r>
+            <a:r>
+              <a:rPr lang="en-US" dirty="0" err="1"/>
+              <a:t>pulsos</a:t>
+            </a:r>
+            <a:r>
+              <a:rPr lang="en-US" dirty="0"/>
+              <a:t> y </a:t>
+            </a:r>
+            <a:r>
+              <a:rPr lang="en-US" dirty="0" err="1"/>
+              <a:t>captando</a:t>
+            </a:r>
+            <a:r>
+              <a:rPr lang="en-US" dirty="0"/>
+              <a:t> la </a:t>
+            </a:r>
+            <a:r>
+              <a:rPr lang="en-US" dirty="0" err="1"/>
+              <a:t>reflexion</a:t>
+            </a:r>
+            <a:r>
+              <a:rPr lang="en-US" dirty="0"/>
+              <a:t> a </a:t>
+            </a:r>
+            <a:r>
+              <a:rPr lang="en-US" dirty="0" err="1"/>
+              <a:t>medida</a:t>
+            </a:r>
+            <a:r>
+              <a:rPr lang="en-US" dirty="0"/>
+              <a:t> que se </a:t>
+            </a:r>
+            <a:r>
+              <a:rPr lang="en-US" dirty="0" err="1"/>
+              <a:t>desplaza</a:t>
+            </a:r>
+            <a:r>
+              <a:rPr lang="en-US" dirty="0"/>
+              <a:t> </a:t>
+            </a:r>
+            <a:r>
+              <a:rPr lang="en-US" dirty="0" err="1"/>
+              <a:t>en</a:t>
+            </a:r>
+            <a:r>
+              <a:rPr lang="en-US" dirty="0"/>
+              <a:t> </a:t>
+            </a:r>
+            <a:r>
+              <a:rPr lang="en-US" dirty="0" err="1"/>
+              <a:t>su</a:t>
+            </a:r>
+            <a:r>
+              <a:rPr lang="en-US" dirty="0"/>
+              <a:t> </a:t>
+            </a:r>
+            <a:r>
+              <a:rPr lang="en-US" dirty="0" err="1"/>
+              <a:t>trayectoria</a:t>
+            </a:r>
+            <a:r>
+              <a:rPr lang="en-US" dirty="0"/>
+              <a:t> </a:t>
+            </a:r>
+            <a:r>
+              <a:rPr lang="en-US" dirty="0" err="1"/>
+              <a:t>sobre</a:t>
+            </a:r>
+            <a:r>
+              <a:rPr lang="en-US" dirty="0"/>
+              <a:t> la </a:t>
+            </a:r>
+            <a:r>
+              <a:rPr lang="en-US" dirty="0" err="1"/>
+              <a:t>superficie</a:t>
+            </a:r>
+            <a:r>
+              <a:rPr lang="en-US" dirty="0"/>
+              <a:t> a </a:t>
+            </a:r>
+            <a:r>
+              <a:rPr lang="en-US" dirty="0" err="1"/>
+              <a:t>relevar</a:t>
+            </a:r>
+            <a:r>
+              <a:rPr lang="en-US" dirty="0"/>
+              <a:t>. </a:t>
+            </a:r>
+            <a:r>
+              <a:rPr lang="en-US" dirty="0" err="1"/>
+              <a:t>Evitando</a:t>
+            </a:r>
+            <a:r>
+              <a:rPr lang="en-US" dirty="0"/>
+              <a:t> </a:t>
+            </a:r>
+            <a:r>
+              <a:rPr lang="en-US" dirty="0" err="1"/>
+              <a:t>tener</a:t>
+            </a:r>
+            <a:r>
+              <a:rPr lang="en-US" dirty="0"/>
+              <a:t> </a:t>
+            </a:r>
+            <a:r>
+              <a:rPr lang="en-US" dirty="0" err="1"/>
+              <a:t>antenas</a:t>
+            </a:r>
+            <a:r>
+              <a:rPr lang="en-US" dirty="0"/>
+              <a:t> de gran </a:t>
+            </a:r>
+            <a:r>
+              <a:rPr lang="en-US" dirty="0" err="1"/>
+              <a:t>longitud</a:t>
+            </a:r>
+            <a:r>
+              <a:rPr lang="en-US" dirty="0"/>
+              <a:t>.</a:t>
+            </a:r>
             <a:endParaRPr lang="es-ES" dirty="0"/>
           </a:p>
         </p:txBody>
       </p:sp>
       <p:sp>
         <p:nvSpPr>
-          <p:cNvPr id="4" name="Marcador de número de diapositiva 3"/>
+          <p:cNvPr id="4" name="Marcador de número de diapositiva 3">
+            <a:extLst>
+              <a:ext uri="{FF2B5EF4-FFF2-40B4-BE49-F238E27FC236}">
+                <a16:creationId xmlns:a16="http://schemas.microsoft.com/office/drawing/2014/main" id="{ABE1B3E1-59EB-331D-9944-B6D8A480A84C}"/>
+              </a:ext>
+            </a:extLst>
+          </p:cNvPr>
           <p:cNvSpPr>
             <a:spLocks noGrp="1"/>
           </p:cNvSpPr>
@@ -4202,7 +4400,7 @@
     </p:spTree>
     <p:extLst>
       <p:ext uri="{BB962C8B-B14F-4D97-AF65-F5344CB8AC3E}">
-        <p14:creationId xmlns:p14="http://schemas.microsoft.com/office/powerpoint/2010/main" val="3721707025"/>
+        <p14:creationId xmlns:p14="http://schemas.microsoft.com/office/powerpoint/2010/main" val="98058018"/>
       </p:ext>
     </p:extLst>
   </p:cSld>
@@ -4217,7 +4415,13 @@
   <p:cSld>
     <p:spTree>
       <p:nvGrpSpPr>
-        <p:cNvPr id="1" name=""/>
+        <p:cNvPr id="1" name="">
+          <a:extLst>
+            <a:ext uri="{FF2B5EF4-FFF2-40B4-BE49-F238E27FC236}">
+              <a16:creationId xmlns:a16="http://schemas.microsoft.com/office/drawing/2014/main" id="{0C695431-F069-0449-D7E8-67680897CF6F}"/>
+            </a:ext>
+          </a:extLst>
+        </p:cNvPr>
         <p:cNvGrpSpPr/>
         <p:nvPr/>
       </p:nvGrpSpPr>
@@ -4231,7 +4435,13 @@
       </p:grpSpPr>
       <p:sp>
         <p:nvSpPr>
-          <p:cNvPr id="2" name="Marcador de imagen de diapositiva 1"/>
+          <p:cNvPr id="2" name="Marcador de imagen de diapositiva 1">
+            <a:extLst>
+              <a:ext uri="{FF2B5EF4-FFF2-40B4-BE49-F238E27FC236}">
+                <a16:creationId xmlns:a16="http://schemas.microsoft.com/office/drawing/2014/main" id="{FA6A4D68-591B-520E-2EB5-8CE5C4AEDAFC}"/>
+              </a:ext>
+            </a:extLst>
+          </p:cNvPr>
           <p:cNvSpPr>
             <a:spLocks noGrp="1" noRot="1" noChangeAspect="1"/>
           </p:cNvSpPr>
@@ -4243,7 +4453,13 @@
       </p:sp>
       <p:sp>
         <p:nvSpPr>
-          <p:cNvPr id="3" name="Marcador de notas 2"/>
+          <p:cNvPr id="3" name="Marcador de notas 2">
+            <a:extLst>
+              <a:ext uri="{FF2B5EF4-FFF2-40B4-BE49-F238E27FC236}">
+                <a16:creationId xmlns:a16="http://schemas.microsoft.com/office/drawing/2014/main" id="{786E2829-8B78-0DC6-6B63-ED078EF1687F}"/>
+              </a:ext>
+            </a:extLst>
+          </p:cNvPr>
           <p:cNvSpPr>
             <a:spLocks noGrp="1"/>
           </p:cNvSpPr>
@@ -4256,13 +4472,191 @@
           <a:bodyPr/>
           <a:lstStyle/>
           <a:p>
+            <a:r>
+              <a:rPr lang="en-US" dirty="0"/>
+              <a:t>En un Sistema de radar de </a:t>
+            </a:r>
+            <a:r>
+              <a:rPr lang="en-US" dirty="0" err="1"/>
+              <a:t>apertura</a:t>
+            </a:r>
+            <a:r>
+              <a:rPr lang="en-US" dirty="0"/>
+              <a:t> </a:t>
+            </a:r>
+            <a:r>
+              <a:rPr lang="en-US" dirty="0" err="1"/>
+              <a:t>sintética</a:t>
+            </a:r>
+            <a:r>
+              <a:rPr lang="en-US" dirty="0"/>
+              <a:t> </a:t>
+            </a:r>
+            <a:r>
+              <a:rPr lang="en-US" dirty="0" err="1"/>
+              <a:t>el</a:t>
+            </a:r>
+            <a:r>
+              <a:rPr lang="en-US" dirty="0"/>
+              <a:t> </a:t>
+            </a:r>
+            <a:r>
+              <a:rPr lang="en-US" dirty="0" err="1"/>
+              <a:t>equipo</a:t>
+            </a:r>
+            <a:r>
+              <a:rPr lang="en-US" dirty="0"/>
+              <a:t> </a:t>
+            </a:r>
+            <a:r>
+              <a:rPr lang="en-US" dirty="0" err="1"/>
+              <a:t>va</a:t>
+            </a:r>
+            <a:r>
+              <a:rPr lang="en-US" dirty="0"/>
+              <a:t> </a:t>
+            </a:r>
+            <a:r>
+              <a:rPr lang="en-US" dirty="0" err="1"/>
+              <a:t>emitiendo</a:t>
+            </a:r>
+            <a:r>
+              <a:rPr lang="en-US" dirty="0"/>
+              <a:t> </a:t>
+            </a:r>
+            <a:r>
+              <a:rPr lang="en-US" dirty="0" err="1"/>
+              <a:t>pulsos</a:t>
+            </a:r>
+            <a:r>
+              <a:rPr lang="en-US" dirty="0"/>
+              <a:t> y </a:t>
+            </a:r>
+            <a:r>
+              <a:rPr lang="en-US" dirty="0" err="1"/>
+              <a:t>captando</a:t>
+            </a:r>
+            <a:r>
+              <a:rPr lang="en-US" dirty="0"/>
+              <a:t> la </a:t>
+            </a:r>
+            <a:r>
+              <a:rPr lang="en-US" dirty="0" err="1"/>
+              <a:t>reflexion</a:t>
+            </a:r>
+            <a:r>
+              <a:rPr lang="en-US" dirty="0"/>
+              <a:t> a </a:t>
+            </a:r>
+            <a:r>
+              <a:rPr lang="en-US" dirty="0" err="1"/>
+              <a:t>medida</a:t>
+            </a:r>
+            <a:r>
+              <a:rPr lang="en-US" dirty="0"/>
+              <a:t> que se </a:t>
+            </a:r>
+            <a:r>
+              <a:rPr lang="en-US" dirty="0" err="1"/>
+              <a:t>desplaza</a:t>
+            </a:r>
+            <a:r>
+              <a:rPr lang="en-US" dirty="0"/>
+              <a:t> </a:t>
+            </a:r>
+            <a:r>
+              <a:rPr lang="en-US" dirty="0" err="1"/>
+              <a:t>en</a:t>
+            </a:r>
+            <a:r>
+              <a:rPr lang="en-US" dirty="0"/>
+              <a:t> </a:t>
+            </a:r>
+            <a:r>
+              <a:rPr lang="en-US" dirty="0" err="1"/>
+              <a:t>su</a:t>
+            </a:r>
+            <a:r>
+              <a:rPr lang="en-US" dirty="0"/>
+              <a:t> </a:t>
+            </a:r>
+            <a:r>
+              <a:rPr lang="en-US" dirty="0" err="1"/>
+              <a:t>trayectoria</a:t>
+            </a:r>
+            <a:r>
+              <a:rPr lang="en-US" dirty="0"/>
+              <a:t> </a:t>
+            </a:r>
+            <a:r>
+              <a:rPr lang="en-US" dirty="0" err="1"/>
+              <a:t>sobre</a:t>
+            </a:r>
+            <a:r>
+              <a:rPr lang="en-US" dirty="0"/>
+              <a:t> la </a:t>
+            </a:r>
+            <a:r>
+              <a:rPr lang="en-US" dirty="0" err="1"/>
+              <a:t>superficie</a:t>
+            </a:r>
+            <a:r>
+              <a:rPr lang="en-US" dirty="0"/>
+              <a:t> a </a:t>
+            </a:r>
+            <a:r>
+              <a:rPr lang="en-US" dirty="0" err="1"/>
+              <a:t>relevar</a:t>
+            </a:r>
+            <a:r>
+              <a:rPr lang="en-US" dirty="0"/>
+              <a:t>. </a:t>
+            </a:r>
+            <a:r>
+              <a:rPr lang="en-US" dirty="0" err="1"/>
+              <a:t>Evitando</a:t>
+            </a:r>
+            <a:r>
+              <a:rPr lang="en-US" dirty="0"/>
+              <a:t> </a:t>
+            </a:r>
+            <a:r>
+              <a:rPr lang="en-US" dirty="0" err="1"/>
+              <a:t>tener</a:t>
+            </a:r>
+            <a:r>
+              <a:rPr lang="en-US" dirty="0"/>
+              <a:t> </a:t>
+            </a:r>
+            <a:r>
+              <a:rPr lang="en-US" dirty="0" err="1"/>
+              <a:t>antenas</a:t>
+            </a:r>
+            <a:r>
+              <a:rPr lang="en-US" dirty="0"/>
+              <a:t> de gran </a:t>
+            </a:r>
+            <a:r>
+              <a:rPr lang="en-US" dirty="0" err="1"/>
+              <a:t>longitud</a:t>
+            </a:r>
+            <a:r>
+              <a:rPr lang="en-US" dirty="0"/>
+              <a:t>.</a:t>
+            </a:r>
             <a:endParaRPr lang="es-ES" dirty="0"/>
           </a:p>
         </p:txBody>
       </p:sp>
       <p:sp>
         <p:nvSpPr>
-          <p:cNvPr id="4" name="Marcador de número de diapositiva 3"/>
+          <p:cNvPr id="4" name="Marcador de número de diapositiva 3">
+            <a:extLst>
+              <a:ext uri="{FF2B5EF4-FFF2-40B4-BE49-F238E27FC236}">
+                <a16:creationId xmlns:a16="http://schemas.microsoft.com/office/drawing/2014/main" id="{14E279E2-6ECE-1F13-0088-F961F90DB6CD}"/>
+              </a:ext>
+            </a:extLst>
+          </p:cNvPr>
           <p:cNvSpPr>
             <a:spLocks noGrp="1"/>
           </p:cNvSpPr>
@@ -4286,7 +4680,7 @@
     </p:spTree>
     <p:extLst>
       <p:ext uri="{BB962C8B-B14F-4D97-AF65-F5344CB8AC3E}">
-        <p14:creationId xmlns:p14="http://schemas.microsoft.com/office/powerpoint/2010/main" val="49153756"/>
+        <p14:creationId xmlns:p14="http://schemas.microsoft.com/office/powerpoint/2010/main" val="3164586405"/>
       </p:ext>
     </p:extLst>
   </p:cSld>
@@ -4362,6 +4756,174 @@
             <a:fld id="{14F55BB7-81D5-48BC-826D-CFE4245227EF}" type="slidenum">
               <a:rPr lang="es-ES" smtClean="0"/>
               <a:t>25</a:t>
+            </a:fld>
+            <a:endParaRPr lang="es-ES"/>
+          </a:p>
+        </p:txBody>
+      </p:sp>
+    </p:spTree>
+    <p:extLst>
+      <p:ext uri="{BB962C8B-B14F-4D97-AF65-F5344CB8AC3E}">
+        <p14:creationId xmlns:p14="http://schemas.microsoft.com/office/powerpoint/2010/main" val="3721707025"/>
+      </p:ext>
+    </p:extLst>
+  </p:cSld>
+  <p:clrMapOvr>
+    <a:masterClrMapping/>
+  </p:clrMapOvr>
+</p:notes>
+</file>
+
+<file path=ppt/notesSlides/notesSlide24.xml><?xml version="1.0" encoding="utf-8"?>
+<p:notes xmlns:a="http://schemas.openxmlformats.org/drawingml/2006/main" xmlns:r="http://schemas.openxmlformats.org/officeDocument/2006/relationships" xmlns:p="http://schemas.openxmlformats.org/presentationml/2006/main">
+  <p:cSld>
+    <p:spTree>
+      <p:nvGrpSpPr>
+        <p:cNvPr id="1" name=""/>
+        <p:cNvGrpSpPr/>
+        <p:nvPr/>
+      </p:nvGrpSpPr>
+      <p:grpSpPr>
+        <a:xfrm>
+          <a:off x="0" y="0"/>
+          <a:ext cx="0" cy="0"/>
+          <a:chOff x="0" y="0"/>
+          <a:chExt cx="0" cy="0"/>
+        </a:xfrm>
+      </p:grpSpPr>
+      <p:sp>
+        <p:nvSpPr>
+          <p:cNvPr id="2" name="Marcador de imagen de diapositiva 1"/>
+          <p:cNvSpPr>
+            <a:spLocks noGrp="1" noRot="1" noChangeAspect="1"/>
+          </p:cNvSpPr>
+          <p:nvPr>
+            <p:ph type="sldImg"/>
+          </p:nvPr>
+        </p:nvSpPr>
+        <p:spPr/>
+      </p:sp>
+      <p:sp>
+        <p:nvSpPr>
+          <p:cNvPr id="3" name="Marcador de notas 2"/>
+          <p:cNvSpPr>
+            <a:spLocks noGrp="1"/>
+          </p:cNvSpPr>
+          <p:nvPr>
+            <p:ph type="body" idx="1"/>
+          </p:nvPr>
+        </p:nvSpPr>
+        <p:spPr/>
+        <p:txBody>
+          <a:bodyPr/>
+          <a:lstStyle/>
+          <a:p>
+            <a:endParaRPr lang="es-ES" dirty="0"/>
+          </a:p>
+        </p:txBody>
+      </p:sp>
+      <p:sp>
+        <p:nvSpPr>
+          <p:cNvPr id="4" name="Marcador de número de diapositiva 3"/>
+          <p:cNvSpPr>
+            <a:spLocks noGrp="1"/>
+          </p:cNvSpPr>
+          <p:nvPr>
+            <p:ph type="sldNum" sz="quarter" idx="5"/>
+          </p:nvPr>
+        </p:nvSpPr>
+        <p:spPr/>
+        <p:txBody>
+          <a:bodyPr/>
+          <a:lstStyle/>
+          <a:p>
+            <a:fld id="{14F55BB7-81D5-48BC-826D-CFE4245227EF}" type="slidenum">
+              <a:rPr lang="es-ES" smtClean="0"/>
+              <a:t>26</a:t>
+            </a:fld>
+            <a:endParaRPr lang="es-ES"/>
+          </a:p>
+        </p:txBody>
+      </p:sp>
+    </p:spTree>
+    <p:extLst>
+      <p:ext uri="{BB962C8B-B14F-4D97-AF65-F5344CB8AC3E}">
+        <p14:creationId xmlns:p14="http://schemas.microsoft.com/office/powerpoint/2010/main" val="49153756"/>
+      </p:ext>
+    </p:extLst>
+  </p:cSld>
+  <p:clrMapOvr>
+    <a:masterClrMapping/>
+  </p:clrMapOvr>
+</p:notes>
+</file>
+
+<file path=ppt/notesSlides/notesSlide25.xml><?xml version="1.0" encoding="utf-8"?>
+<p:notes xmlns:a="http://schemas.openxmlformats.org/drawingml/2006/main" xmlns:r="http://schemas.openxmlformats.org/officeDocument/2006/relationships" xmlns:p="http://schemas.openxmlformats.org/presentationml/2006/main">
+  <p:cSld>
+    <p:spTree>
+      <p:nvGrpSpPr>
+        <p:cNvPr id="1" name=""/>
+        <p:cNvGrpSpPr/>
+        <p:nvPr/>
+      </p:nvGrpSpPr>
+      <p:grpSpPr>
+        <a:xfrm>
+          <a:off x="0" y="0"/>
+          <a:ext cx="0" cy="0"/>
+          <a:chOff x="0" y="0"/>
+          <a:chExt cx="0" cy="0"/>
+        </a:xfrm>
+      </p:grpSpPr>
+      <p:sp>
+        <p:nvSpPr>
+          <p:cNvPr id="2" name="Marcador de imagen de diapositiva 1"/>
+          <p:cNvSpPr>
+            <a:spLocks noGrp="1" noRot="1" noChangeAspect="1"/>
+          </p:cNvSpPr>
+          <p:nvPr>
+            <p:ph type="sldImg"/>
+          </p:nvPr>
+        </p:nvSpPr>
+        <p:spPr/>
+      </p:sp>
+      <p:sp>
+        <p:nvSpPr>
+          <p:cNvPr id="3" name="Marcador de notas 2"/>
+          <p:cNvSpPr>
+            <a:spLocks noGrp="1"/>
+          </p:cNvSpPr>
+          <p:nvPr>
+            <p:ph type="body" idx="1"/>
+          </p:nvPr>
+        </p:nvSpPr>
+        <p:spPr/>
+        <p:txBody>
+          <a:bodyPr/>
+          <a:lstStyle/>
+          <a:p>
+            <a:endParaRPr lang="es-ES" dirty="0"/>
+          </a:p>
+        </p:txBody>
+      </p:sp>
+      <p:sp>
+        <p:nvSpPr>
+          <p:cNvPr id="4" name="Marcador de número de diapositiva 3"/>
+          <p:cNvSpPr>
+            <a:spLocks noGrp="1"/>
+          </p:cNvSpPr>
+          <p:nvPr>
+            <p:ph type="sldNum" sz="quarter" idx="5"/>
+          </p:nvPr>
+        </p:nvSpPr>
+        <p:spPr/>
+        <p:txBody>
+          <a:bodyPr/>
+          <a:lstStyle/>
+          <a:p>
+            <a:fld id="{14F55BB7-81D5-48BC-826D-CFE4245227EF}" type="slidenum">
+              <a:rPr lang="es-ES" smtClean="0"/>
+              <a:t>27</a:t>
             </a:fld>
             <a:endParaRPr lang="es-ES"/>
           </a:p>
@@ -6415,7 +6977,7 @@
           <a:p>
             <a:fld id="{646C8DCA-2E12-4F18-B593-89C0B9C51B89}" type="datetime1">
               <a:rPr lang="es-ES" smtClean="0"/>
-              <a:t>09/10/2024</a:t>
+              <a:t>10/10/2024</a:t>
             </a:fld>
             <a:endParaRPr lang="es-ES"/>
           </a:p>
@@ -6613,7 +7175,7 @@
           <a:p>
             <a:fld id="{A5BC0FAF-9ECB-4F55-ABF9-621ADE5A39A2}" type="datetime1">
               <a:rPr lang="es-ES" smtClean="0"/>
-              <a:t>09/10/2024</a:t>
+              <a:t>10/10/2024</a:t>
             </a:fld>
             <a:endParaRPr lang="es-ES"/>
           </a:p>
@@ -6821,7 +7383,7 @@
           <a:p>
             <a:fld id="{80024CFD-ADEA-4465-A1EC-ABD1DEBE2459}" type="datetime1">
               <a:rPr lang="es-ES" smtClean="0"/>
-              <a:t>09/10/2024</a:t>
+              <a:t>10/10/2024</a:t>
             </a:fld>
             <a:endParaRPr lang="es-ES"/>
           </a:p>
@@ -7019,7 +7581,7 @@
           <a:p>
             <a:fld id="{FDE92F5F-D6DE-4C14-855C-80AF0356AD71}" type="datetime1">
               <a:rPr lang="es-ES" smtClean="0"/>
-              <a:t>09/10/2024</a:t>
+              <a:t>10/10/2024</a:t>
             </a:fld>
             <a:endParaRPr lang="es-ES"/>
           </a:p>
@@ -7294,7 +7856,7 @@
           <a:p>
             <a:fld id="{6FAFD61B-8EE6-45AD-8002-A0391AC98859}" type="datetime1">
               <a:rPr lang="es-ES" smtClean="0"/>
-              <a:t>09/10/2024</a:t>
+              <a:t>10/10/2024</a:t>
             </a:fld>
             <a:endParaRPr lang="es-ES"/>
           </a:p>
@@ -7559,7 +8121,7 @@
           <a:p>
             <a:fld id="{4FA5E0D1-6707-4855-8DBB-2DA7964E34C8}" type="datetime1">
               <a:rPr lang="es-ES" smtClean="0"/>
-              <a:t>09/10/2024</a:t>
+              <a:t>10/10/2024</a:t>
             </a:fld>
             <a:endParaRPr lang="es-ES"/>
           </a:p>
@@ -7971,7 +8533,7 @@
           <a:p>
             <a:fld id="{825B4E85-07D9-4834-A612-DD9DE7544DC7}" type="datetime1">
               <a:rPr lang="es-ES" smtClean="0"/>
-              <a:t>09/10/2024</a:t>
+              <a:t>10/10/2024</a:t>
             </a:fld>
             <a:endParaRPr lang="es-ES"/>
           </a:p>
@@ -8112,7 +8674,7 @@
           <a:p>
             <a:fld id="{514E39CD-5525-42E4-83A2-BEF14F3AC35F}" type="datetime1">
               <a:rPr lang="es-ES" smtClean="0"/>
-              <a:t>09/10/2024</a:t>
+              <a:t>10/10/2024</a:t>
             </a:fld>
             <a:endParaRPr lang="es-ES"/>
           </a:p>
@@ -8225,7 +8787,7 @@
           <a:p>
             <a:fld id="{08A2A212-5EC6-4C79-AE54-BB8B972173E3}" type="datetime1">
               <a:rPr lang="es-ES" smtClean="0"/>
-              <a:t>09/10/2024</a:t>
+              <a:t>10/10/2024</a:t>
             </a:fld>
             <a:endParaRPr lang="es-ES"/>
           </a:p>
@@ -8536,7 +9098,7 @@
           <a:p>
             <a:fld id="{CFB9373C-1B99-45D2-B4B3-E7C72E5CD731}" type="datetime1">
               <a:rPr lang="es-ES" smtClean="0"/>
-              <a:t>09/10/2024</a:t>
+              <a:t>10/10/2024</a:t>
             </a:fld>
             <a:endParaRPr lang="es-ES"/>
           </a:p>
@@ -8824,7 +9386,7 @@
           <a:p>
             <a:fld id="{E17769D5-AD88-48F4-8698-D69339E94882}" type="datetime1">
               <a:rPr lang="es-ES" smtClean="0"/>
-              <a:t>09/10/2024</a:t>
+              <a:t>10/10/2024</a:t>
             </a:fld>
             <a:endParaRPr lang="es-ES"/>
           </a:p>
@@ -9065,7 +9627,7 @@
           <a:p>
             <a:fld id="{477EC82B-729B-4D6F-8C0B-63E46E4A0B30}" type="datetime1">
               <a:rPr lang="es-ES" smtClean="0"/>
-              <a:t>09/10/2024</a:t>
+              <a:t>10/10/2024</a:t>
             </a:fld>
             <a:endParaRPr lang="es-ES"/>
           </a:p>
@@ -11592,628 +12154,550 @@
           </a:p>
         </p:txBody>
       </p:sp>
-      <p:sp>
-        <p:nvSpPr>
-          <p:cNvPr id="5" name="Título 1">
-            <a:extLst>
-              <a:ext uri="{FF2B5EF4-FFF2-40B4-BE49-F238E27FC236}">
-                <a16:creationId xmlns:a16="http://schemas.microsoft.com/office/drawing/2014/main" id="{9C1D5527-351C-4646-AF65-C51EE5B6C0CC}"/>
-              </a:ext>
-            </a:extLst>
-          </p:cNvPr>
-          <p:cNvSpPr txBox="1">
-            <a:spLocks/>
-          </p:cNvSpPr>
+      <p:grpSp>
+        <p:nvGrpSpPr>
+          <p:cNvPr id="7" name="Grupo 6">
+            <a:extLst>
+              <a:ext uri="{FF2B5EF4-FFF2-40B4-BE49-F238E27FC236}">
+                <a16:creationId xmlns:a16="http://schemas.microsoft.com/office/drawing/2014/main" id="{450EBE44-6AC9-54E5-A5F4-2CC6697D0D5B}"/>
+              </a:ext>
+            </a:extLst>
+          </p:cNvPr>
+          <p:cNvGrpSpPr/>
           <p:nvPr/>
-        </p:nvSpPr>
-        <p:spPr>
+        </p:nvGrpSpPr>
+        <p:grpSpPr>
           <a:xfrm>
-            <a:off x="838200" y="1500530"/>
-            <a:ext cx="10515600" cy="2081212"/>
+            <a:off x="3394953" y="1690688"/>
+            <a:ext cx="5215647" cy="4301550"/>
+            <a:chOff x="3394953" y="1690688"/>
+            <a:chExt cx="5215647" cy="4301550"/>
           </a:xfrm>
-          <a:prstGeom prst="rect">
-            <a:avLst/>
-          </a:prstGeom>
-        </p:spPr>
-        <p:txBody>
-          <a:bodyPr vert="horz" lIns="91440" tIns="45720" rIns="91440" bIns="45720" rtlCol="0" anchor="t" anchorCtr="0">
-            <a:noAutofit/>
-          </a:bodyPr>
-          <a:lstStyle>
-            <a:lvl1pPr algn="ctr" defTabSz="914400" rtl="0" eaLnBrk="1" latinLnBrk="0" hangingPunct="1">
-              <a:lnSpc>
-                <a:spcPct val="90000"/>
-              </a:lnSpc>
-              <a:spcBef>
-                <a:spcPct val="0"/>
-              </a:spcBef>
-              <a:buNone/>
-              <a:defRPr sz="6000" kern="1200">
-                <a:solidFill>
-                  <a:schemeClr val="tx1"/>
-                </a:solidFill>
-                <a:latin typeface="+mj-lt"/>
-                <a:ea typeface="+mj-ea"/>
-                <a:cs typeface="+mj-cs"/>
-              </a:defRPr>
-            </a:lvl1pPr>
-          </a:lstStyle>
-          <a:p>
-            <a:pPr algn="l"/>
-            <a:endParaRPr lang="es-ES" sz="3200" dirty="0"/>
-          </a:p>
-        </p:txBody>
-      </p:sp>
-      <p:sp>
-        <p:nvSpPr>
-          <p:cNvPr id="6" name="CuadroTexto 5">
-            <a:extLst>
-              <a:ext uri="{FF2B5EF4-FFF2-40B4-BE49-F238E27FC236}">
-                <a16:creationId xmlns:a16="http://schemas.microsoft.com/office/drawing/2014/main" id="{72BB8E5F-266D-098A-B599-1EF9C7DAF47C}"/>
-              </a:ext>
-            </a:extLst>
-          </p:cNvPr>
-          <p:cNvSpPr txBox="1"/>
-          <p:nvPr/>
-        </p:nvSpPr>
-        <p:spPr>
-          <a:xfrm>
-            <a:off x="3047189" y="3244334"/>
-            <a:ext cx="6094378" cy="369332"/>
-          </a:xfrm>
-          <a:prstGeom prst="rect">
-            <a:avLst/>
-          </a:prstGeom>
-          <a:noFill/>
-        </p:spPr>
-        <p:txBody>
-          <a:bodyPr wrap="square">
-            <a:spAutoFit/>
-          </a:bodyPr>
-          <a:lstStyle/>
-          <a:p>
-            <a:r>
-              <a:rPr lang="es-ES" b="0" dirty="0">
-                <a:solidFill>
-                  <a:srgbClr val="D4D4D4"/>
-                </a:solidFill>
-                <a:effectLst/>
-                <a:latin typeface="Consolas" panose="020B0609020204030204" pitchFamily="49" charset="0"/>
-              </a:rPr>
-              <a:t>*(</a:t>
-            </a:r>
-            <a:r>
-              <a:rPr lang="es-ES" b="0" dirty="0">
-                <a:solidFill>
-                  <a:srgbClr val="C8C8C8"/>
-                </a:solidFill>
-                <a:effectLst/>
-                <a:latin typeface="Consolas" panose="020B0609020204030204" pitchFamily="49" charset="0"/>
-              </a:rPr>
-              <a:t>n</a:t>
-            </a:r>
-            <a:r>
-              <a:rPr lang="es-ES" b="0" dirty="0">
-                <a:solidFill>
-                  <a:srgbClr val="D4D4D4"/>
-                </a:solidFill>
-                <a:effectLst/>
-                <a:latin typeface="Consolas" panose="020B0609020204030204" pitchFamily="49" charset="0"/>
-              </a:rPr>
-              <a:t>-</a:t>
-            </a:r>
-            <a:r>
-              <a:rPr lang="es-ES" b="0" dirty="0">
-                <a:solidFill>
-                  <a:srgbClr val="B5CEA8"/>
-                </a:solidFill>
-                <a:effectLst/>
-                <a:latin typeface="Consolas" panose="020B0609020204030204" pitchFamily="49" charset="0"/>
-              </a:rPr>
-              <a:t>1</a:t>
-            </a:r>
-            <a:r>
-              <a:rPr lang="es-ES" b="0" dirty="0">
-                <a:solidFill>
-                  <a:srgbClr val="D4D4D4"/>
-                </a:solidFill>
-                <a:effectLst/>
-                <a:latin typeface="Consolas" panose="020B0609020204030204" pitchFamily="49" charset="0"/>
-              </a:rPr>
-              <a:t>-</a:t>
-            </a:r>
-            <a:r>
-              <a:rPr lang="es-ES" b="0" dirty="0">
-                <a:solidFill>
-                  <a:srgbClr val="C8C8C8"/>
-                </a:solidFill>
-                <a:effectLst/>
-                <a:latin typeface="Consolas" panose="020B0609020204030204" pitchFamily="49" charset="0"/>
-              </a:rPr>
-              <a:t>i</a:t>
-            </a:r>
-            <a:r>
-              <a:rPr lang="es-ES" b="0" dirty="0">
-                <a:solidFill>
-                  <a:srgbClr val="D4D4D4"/>
-                </a:solidFill>
-                <a:effectLst/>
-                <a:latin typeface="Consolas" panose="020B0609020204030204" pitchFamily="49" charset="0"/>
-              </a:rPr>
-              <a:t>)</a:t>
-            </a:r>
-          </a:p>
-        </p:txBody>
-      </p:sp>
-      <p:sp>
-        <p:nvSpPr>
-          <p:cNvPr id="17" name="Elipse 16">
-            <a:extLst>
-              <a:ext uri="{FF2B5EF4-FFF2-40B4-BE49-F238E27FC236}">
-                <a16:creationId xmlns:a16="http://schemas.microsoft.com/office/drawing/2014/main" id="{85958801-0EBB-456F-9865-B97041369A87}"/>
-              </a:ext>
-            </a:extLst>
-          </p:cNvPr>
-          <p:cNvSpPr/>
-          <p:nvPr/>
-        </p:nvSpPr>
-        <p:spPr>
-          <a:xfrm>
-            <a:off x="4085617" y="4847450"/>
-            <a:ext cx="252919" cy="243192"/>
-          </a:xfrm>
-          <a:prstGeom prst="ellipse">
-            <a:avLst/>
-          </a:prstGeom>
-        </p:spPr>
-        <p:style>
-          <a:lnRef idx="2">
-            <a:schemeClr val="accent1">
-              <a:shade val="15000"/>
-            </a:schemeClr>
-          </a:lnRef>
-          <a:fillRef idx="1">
-            <a:schemeClr val="accent1"/>
-          </a:fillRef>
-          <a:effectRef idx="0">
-            <a:schemeClr val="accent1"/>
-          </a:effectRef>
-          <a:fontRef idx="minor">
-            <a:schemeClr val="lt1"/>
-          </a:fontRef>
-        </p:style>
-        <p:txBody>
-          <a:bodyPr rtlCol="0" anchor="ctr"/>
-          <a:lstStyle/>
-          <a:p>
-            <a:pPr algn="ctr"/>
-            <a:endParaRPr lang="es-ES"/>
-          </a:p>
-        </p:txBody>
-      </p:sp>
-      <p:sp>
-        <p:nvSpPr>
-          <p:cNvPr id="18" name="Elipse 17">
-            <a:extLst>
-              <a:ext uri="{FF2B5EF4-FFF2-40B4-BE49-F238E27FC236}">
-                <a16:creationId xmlns:a16="http://schemas.microsoft.com/office/drawing/2014/main" id="{658847C7-A607-3363-7B58-7F44248AEEB5}"/>
-              </a:ext>
-            </a:extLst>
-          </p:cNvPr>
-          <p:cNvSpPr/>
-          <p:nvPr/>
-        </p:nvSpPr>
-        <p:spPr>
-          <a:xfrm>
-            <a:off x="5171872" y="4847450"/>
-            <a:ext cx="252919" cy="243192"/>
-          </a:xfrm>
-          <a:prstGeom prst="ellipse">
-            <a:avLst/>
-          </a:prstGeom>
-        </p:spPr>
-        <p:style>
-          <a:lnRef idx="2">
-            <a:schemeClr val="accent1">
-              <a:shade val="15000"/>
-            </a:schemeClr>
-          </a:lnRef>
-          <a:fillRef idx="1">
-            <a:schemeClr val="accent1"/>
-          </a:fillRef>
-          <a:effectRef idx="0">
-            <a:schemeClr val="accent1"/>
-          </a:effectRef>
-          <a:fontRef idx="minor">
-            <a:schemeClr val="lt1"/>
-          </a:fontRef>
-        </p:style>
-        <p:txBody>
-          <a:bodyPr rtlCol="0" anchor="ctr"/>
-          <a:lstStyle/>
-          <a:p>
-            <a:pPr algn="ctr"/>
-            <a:endParaRPr lang="es-ES"/>
-          </a:p>
-        </p:txBody>
-      </p:sp>
-      <p:sp>
-        <p:nvSpPr>
-          <p:cNvPr id="19" name="Elipse 18">
-            <a:extLst>
-              <a:ext uri="{FF2B5EF4-FFF2-40B4-BE49-F238E27FC236}">
-                <a16:creationId xmlns:a16="http://schemas.microsoft.com/office/drawing/2014/main" id="{33AEA61F-FBEE-C43B-082A-2E87476F245D}"/>
-              </a:ext>
-            </a:extLst>
-          </p:cNvPr>
-          <p:cNvSpPr/>
-          <p:nvPr/>
-        </p:nvSpPr>
-        <p:spPr>
-          <a:xfrm>
-            <a:off x="7344382" y="4847450"/>
-            <a:ext cx="252919" cy="243192"/>
-          </a:xfrm>
-          <a:prstGeom prst="ellipse">
-            <a:avLst/>
-          </a:prstGeom>
-        </p:spPr>
-        <p:style>
-          <a:lnRef idx="2">
-            <a:schemeClr val="accent1">
-              <a:shade val="15000"/>
-            </a:schemeClr>
-          </a:lnRef>
-          <a:fillRef idx="1">
-            <a:schemeClr val="accent1"/>
-          </a:fillRef>
-          <a:effectRef idx="0">
-            <a:schemeClr val="accent1"/>
-          </a:effectRef>
-          <a:fontRef idx="minor">
-            <a:schemeClr val="lt1"/>
-          </a:fontRef>
-        </p:style>
-        <p:txBody>
-          <a:bodyPr rtlCol="0" anchor="ctr"/>
-          <a:lstStyle/>
-          <a:p>
-            <a:pPr algn="ctr"/>
-            <a:endParaRPr lang="es-ES"/>
-          </a:p>
-        </p:txBody>
-      </p:sp>
-      <p:sp>
-        <p:nvSpPr>
-          <p:cNvPr id="20" name="Elipse 19">
-            <a:extLst>
-              <a:ext uri="{FF2B5EF4-FFF2-40B4-BE49-F238E27FC236}">
-                <a16:creationId xmlns:a16="http://schemas.microsoft.com/office/drawing/2014/main" id="{F3418F53-FF3D-1389-B45C-C847851063C1}"/>
-              </a:ext>
-            </a:extLst>
-          </p:cNvPr>
-          <p:cNvSpPr/>
-          <p:nvPr/>
-        </p:nvSpPr>
-        <p:spPr>
-          <a:xfrm>
-            <a:off x="6258127" y="4847450"/>
-            <a:ext cx="252919" cy="243192"/>
-          </a:xfrm>
-          <a:prstGeom prst="ellipse">
-            <a:avLst/>
-          </a:prstGeom>
-          <a:solidFill>
-            <a:srgbClr val="FF0000"/>
-          </a:solidFill>
-        </p:spPr>
-        <p:style>
-          <a:lnRef idx="2">
-            <a:schemeClr val="accent1">
-              <a:shade val="15000"/>
-            </a:schemeClr>
-          </a:lnRef>
-          <a:fillRef idx="1">
-            <a:schemeClr val="accent1"/>
-          </a:fillRef>
-          <a:effectRef idx="0">
-            <a:schemeClr val="accent1"/>
-          </a:effectRef>
-          <a:fontRef idx="minor">
-            <a:schemeClr val="lt1"/>
-          </a:fontRef>
-        </p:style>
-        <p:txBody>
-          <a:bodyPr rtlCol="0" anchor="ctr"/>
-          <a:lstStyle/>
-          <a:p>
-            <a:pPr algn="ctr"/>
-            <a:endParaRPr lang="es-ES"/>
-          </a:p>
-        </p:txBody>
-      </p:sp>
-      <p:sp>
-        <p:nvSpPr>
-          <p:cNvPr id="21" name="CuadroTexto 20">
-            <a:extLst>
-              <a:ext uri="{FF2B5EF4-FFF2-40B4-BE49-F238E27FC236}">
-                <a16:creationId xmlns:a16="http://schemas.microsoft.com/office/drawing/2014/main" id="{A00BF47D-EBBA-849C-D7FE-5F9860ECB998}"/>
-              </a:ext>
-            </a:extLst>
-          </p:cNvPr>
-          <p:cNvSpPr txBox="1"/>
-          <p:nvPr/>
-        </p:nvSpPr>
-        <p:spPr>
-          <a:xfrm>
-            <a:off x="4058027" y="5090642"/>
-            <a:ext cx="308098" cy="369332"/>
-          </a:xfrm>
-          <a:prstGeom prst="rect">
-            <a:avLst/>
-          </a:prstGeom>
-          <a:noFill/>
-        </p:spPr>
-        <p:txBody>
-          <a:bodyPr wrap="none" rtlCol="0">
-            <a:spAutoFit/>
-          </a:bodyPr>
-          <a:lstStyle/>
-          <a:p>
-            <a:r>
-              <a:rPr lang="en-US" dirty="0"/>
-              <a:t>0</a:t>
-            </a:r>
-            <a:endParaRPr lang="es-ES" dirty="0"/>
-          </a:p>
-        </p:txBody>
-      </p:sp>
-      <p:sp>
-        <p:nvSpPr>
-          <p:cNvPr id="22" name="CuadroTexto 21">
-            <a:extLst>
-              <a:ext uri="{FF2B5EF4-FFF2-40B4-BE49-F238E27FC236}">
-                <a16:creationId xmlns:a16="http://schemas.microsoft.com/office/drawing/2014/main" id="{8874484E-F204-19D8-7598-827C67E763CE}"/>
-              </a:ext>
-            </a:extLst>
-          </p:cNvPr>
-          <p:cNvSpPr txBox="1"/>
-          <p:nvPr/>
-        </p:nvSpPr>
-        <p:spPr>
-          <a:xfrm>
-            <a:off x="5144282" y="5090642"/>
-            <a:ext cx="308098" cy="369332"/>
-          </a:xfrm>
-          <a:prstGeom prst="rect">
-            <a:avLst/>
-          </a:prstGeom>
-          <a:noFill/>
-        </p:spPr>
-        <p:txBody>
-          <a:bodyPr wrap="none" rtlCol="0">
-            <a:spAutoFit/>
-          </a:bodyPr>
-          <a:lstStyle/>
-          <a:p>
-            <a:r>
-              <a:rPr lang="en-US" dirty="0"/>
-              <a:t>1</a:t>
-            </a:r>
-            <a:endParaRPr lang="es-ES" dirty="0"/>
-          </a:p>
-        </p:txBody>
-      </p:sp>
-      <p:sp>
-        <p:nvSpPr>
-          <p:cNvPr id="23" name="CuadroTexto 22">
-            <a:extLst>
-              <a:ext uri="{FF2B5EF4-FFF2-40B4-BE49-F238E27FC236}">
-                <a16:creationId xmlns:a16="http://schemas.microsoft.com/office/drawing/2014/main" id="{2B31CE17-5C21-D3B4-6900-D49D330BD876}"/>
-              </a:ext>
-            </a:extLst>
-          </p:cNvPr>
-          <p:cNvSpPr txBox="1"/>
-          <p:nvPr/>
-        </p:nvSpPr>
-        <p:spPr>
-          <a:xfrm>
-            <a:off x="6258127" y="5090642"/>
-            <a:ext cx="308098" cy="369332"/>
-          </a:xfrm>
-          <a:prstGeom prst="rect">
-            <a:avLst/>
-          </a:prstGeom>
-          <a:noFill/>
-        </p:spPr>
-        <p:txBody>
-          <a:bodyPr wrap="none" rtlCol="0">
-            <a:spAutoFit/>
-          </a:bodyPr>
-          <a:lstStyle/>
-          <a:p>
-            <a:r>
-              <a:rPr lang="en-US" dirty="0"/>
-              <a:t>2</a:t>
-            </a:r>
-            <a:endParaRPr lang="es-ES" dirty="0"/>
-          </a:p>
-        </p:txBody>
-      </p:sp>
-      <p:sp>
-        <p:nvSpPr>
-          <p:cNvPr id="24" name="CuadroTexto 23">
-            <a:extLst>
-              <a:ext uri="{FF2B5EF4-FFF2-40B4-BE49-F238E27FC236}">
-                <a16:creationId xmlns:a16="http://schemas.microsoft.com/office/drawing/2014/main" id="{62EC6594-A0F2-7476-6AB7-C58874DDA760}"/>
-              </a:ext>
-            </a:extLst>
-          </p:cNvPr>
-          <p:cNvSpPr txBox="1"/>
-          <p:nvPr/>
-        </p:nvSpPr>
-        <p:spPr>
-          <a:xfrm>
-            <a:off x="7371972" y="5090642"/>
-            <a:ext cx="308098" cy="369332"/>
-          </a:xfrm>
-          <a:prstGeom prst="rect">
-            <a:avLst/>
-          </a:prstGeom>
-          <a:noFill/>
-        </p:spPr>
-        <p:txBody>
-          <a:bodyPr wrap="none" rtlCol="0">
-            <a:spAutoFit/>
-          </a:bodyPr>
-          <a:lstStyle/>
-          <a:p>
-            <a:r>
-              <a:rPr lang="en-US" dirty="0"/>
-              <a:t>3</a:t>
-            </a:r>
-            <a:endParaRPr lang="es-ES" dirty="0"/>
-          </a:p>
-        </p:txBody>
-      </p:sp>
-      <p:sp>
-        <p:nvSpPr>
-          <p:cNvPr id="25" name="Trapecio 24">
-            <a:extLst>
-              <a:ext uri="{FF2B5EF4-FFF2-40B4-BE49-F238E27FC236}">
-                <a16:creationId xmlns:a16="http://schemas.microsoft.com/office/drawing/2014/main" id="{64C78C4E-00F4-3004-2D31-6E62023B5F8D}"/>
-              </a:ext>
-            </a:extLst>
-          </p:cNvPr>
-          <p:cNvSpPr/>
-          <p:nvPr/>
-        </p:nvSpPr>
-        <p:spPr>
-          <a:xfrm>
-            <a:off x="4058027" y="2305455"/>
-            <a:ext cx="308098" cy="272375"/>
-          </a:xfrm>
-          <a:prstGeom prst="trapezoid">
-            <a:avLst/>
-          </a:prstGeom>
-        </p:spPr>
-        <p:style>
-          <a:lnRef idx="2">
-            <a:schemeClr val="accent1">
-              <a:shade val="15000"/>
-            </a:schemeClr>
-          </a:lnRef>
-          <a:fillRef idx="1">
-            <a:schemeClr val="accent1"/>
-          </a:fillRef>
-          <a:effectRef idx="0">
-            <a:schemeClr val="accent1"/>
-          </a:effectRef>
-          <a:fontRef idx="minor">
-            <a:schemeClr val="lt1"/>
-          </a:fontRef>
-        </p:style>
-        <p:txBody>
-          <a:bodyPr rtlCol="0" anchor="ctr"/>
-          <a:lstStyle/>
-          <a:p>
-            <a:pPr algn="ctr"/>
-            <a:endParaRPr lang="es-ES"/>
-          </a:p>
-        </p:txBody>
-      </p:sp>
-      <p:sp>
-        <p:nvSpPr>
-          <p:cNvPr id="26" name="Trapecio 25">
-            <a:extLst>
-              <a:ext uri="{FF2B5EF4-FFF2-40B4-BE49-F238E27FC236}">
-                <a16:creationId xmlns:a16="http://schemas.microsoft.com/office/drawing/2014/main" id="{F24B0738-D59E-6E86-E68E-1FC0BD0B9646}"/>
-              </a:ext>
-            </a:extLst>
-          </p:cNvPr>
-          <p:cNvSpPr/>
-          <p:nvPr/>
-        </p:nvSpPr>
-        <p:spPr>
-          <a:xfrm>
-            <a:off x="5144225" y="2305453"/>
-            <a:ext cx="308098" cy="272375"/>
-          </a:xfrm>
-          <a:prstGeom prst="trapezoid">
-            <a:avLst/>
-          </a:prstGeom>
-        </p:spPr>
-        <p:style>
-          <a:lnRef idx="2">
-            <a:schemeClr val="accent1">
-              <a:shade val="15000"/>
-            </a:schemeClr>
-          </a:lnRef>
-          <a:fillRef idx="1">
-            <a:schemeClr val="accent1"/>
-          </a:fillRef>
-          <a:effectRef idx="0">
-            <a:schemeClr val="accent1"/>
-          </a:effectRef>
-          <a:fontRef idx="minor">
-            <a:schemeClr val="lt1"/>
-          </a:fontRef>
-        </p:style>
-        <p:txBody>
-          <a:bodyPr rtlCol="0" anchor="ctr"/>
-          <a:lstStyle/>
-          <a:p>
-            <a:pPr algn="ctr"/>
-            <a:endParaRPr lang="es-ES"/>
-          </a:p>
-        </p:txBody>
-      </p:sp>
-      <p:sp>
-        <p:nvSpPr>
-          <p:cNvPr id="27" name="Trapecio 26">
-            <a:extLst>
-              <a:ext uri="{FF2B5EF4-FFF2-40B4-BE49-F238E27FC236}">
-                <a16:creationId xmlns:a16="http://schemas.microsoft.com/office/drawing/2014/main" id="{E135C980-E97A-F190-3059-5E33503EDC21}"/>
-              </a:ext>
-            </a:extLst>
-          </p:cNvPr>
-          <p:cNvSpPr/>
-          <p:nvPr/>
-        </p:nvSpPr>
-        <p:spPr>
-          <a:xfrm>
-            <a:off x="6258852" y="2305453"/>
-            <a:ext cx="308098" cy="272375"/>
-          </a:xfrm>
-          <a:prstGeom prst="trapezoid">
-            <a:avLst/>
-          </a:prstGeom>
-        </p:spPr>
-        <p:style>
-          <a:lnRef idx="2">
-            <a:schemeClr val="accent1">
-              <a:shade val="15000"/>
-            </a:schemeClr>
-          </a:lnRef>
-          <a:fillRef idx="1">
-            <a:schemeClr val="accent1"/>
-          </a:fillRef>
-          <a:effectRef idx="0">
-            <a:schemeClr val="accent1"/>
-          </a:effectRef>
-          <a:fontRef idx="minor">
-            <a:schemeClr val="lt1"/>
-          </a:fontRef>
-        </p:style>
-        <p:txBody>
-          <a:bodyPr rtlCol="0" anchor="ctr"/>
-          <a:lstStyle/>
-          <a:p>
-            <a:pPr algn="ctr"/>
-            <a:endParaRPr lang="es-ES"/>
-          </a:p>
-        </p:txBody>
-      </p:sp>
+        </p:grpSpPr>
+        <p:sp>
+          <p:nvSpPr>
+            <p:cNvPr id="3" name="Rectángulo 2">
+              <a:extLst>
+                <a:ext uri="{FF2B5EF4-FFF2-40B4-BE49-F238E27FC236}">
+                  <a16:creationId xmlns:a16="http://schemas.microsoft.com/office/drawing/2014/main" id="{6E41DA20-0231-8DFD-2D49-F38AF2C820AE}"/>
+                </a:ext>
+              </a:extLst>
+            </p:cNvPr>
+            <p:cNvSpPr/>
+            <p:nvPr/>
+          </p:nvSpPr>
+          <p:spPr>
+            <a:xfrm>
+              <a:off x="3394953" y="1690688"/>
+              <a:ext cx="5215647" cy="4301550"/>
+            </a:xfrm>
+            <a:prstGeom prst="rect">
+              <a:avLst/>
+            </a:prstGeom>
+            <a:solidFill>
+              <a:schemeClr val="bg1"/>
+            </a:solidFill>
+            <a:ln>
+              <a:solidFill>
+                <a:schemeClr val="bg1"/>
+              </a:solidFill>
+            </a:ln>
+          </p:spPr>
+          <p:style>
+            <a:lnRef idx="2">
+              <a:schemeClr val="accent1">
+                <a:shade val="15000"/>
+              </a:schemeClr>
+            </a:lnRef>
+            <a:fillRef idx="1">
+              <a:schemeClr val="accent1"/>
+            </a:fillRef>
+            <a:effectRef idx="0">
+              <a:schemeClr val="accent1"/>
+            </a:effectRef>
+            <a:fontRef idx="minor">
+              <a:schemeClr val="lt1"/>
+            </a:fontRef>
+          </p:style>
+          <p:txBody>
+            <a:bodyPr rtlCol="0" anchor="ctr"/>
+            <a:lstStyle/>
+            <a:p>
+              <a:pPr algn="ctr"/>
+              <a:endParaRPr lang="es-ES"/>
+            </a:p>
+          </p:txBody>
+        </p:sp>
+        <p:sp>
+          <p:nvSpPr>
+            <p:cNvPr id="17" name="Elipse 16">
+              <a:extLst>
+                <a:ext uri="{FF2B5EF4-FFF2-40B4-BE49-F238E27FC236}">
+                  <a16:creationId xmlns:a16="http://schemas.microsoft.com/office/drawing/2014/main" id="{85958801-0EBB-456F-9865-B97041369A87}"/>
+                </a:ext>
+              </a:extLst>
+            </p:cNvPr>
+            <p:cNvSpPr/>
+            <p:nvPr/>
+          </p:nvSpPr>
+          <p:spPr>
+            <a:xfrm>
+              <a:off x="4085617" y="4847450"/>
+              <a:ext cx="252919" cy="243192"/>
+            </a:xfrm>
+            <a:prstGeom prst="ellipse">
+              <a:avLst/>
+            </a:prstGeom>
+          </p:spPr>
+          <p:style>
+            <a:lnRef idx="2">
+              <a:schemeClr val="accent1">
+                <a:shade val="15000"/>
+              </a:schemeClr>
+            </a:lnRef>
+            <a:fillRef idx="1">
+              <a:schemeClr val="accent1"/>
+            </a:fillRef>
+            <a:effectRef idx="0">
+              <a:schemeClr val="accent1"/>
+            </a:effectRef>
+            <a:fontRef idx="minor">
+              <a:schemeClr val="lt1"/>
+            </a:fontRef>
+          </p:style>
+          <p:txBody>
+            <a:bodyPr rtlCol="0" anchor="ctr"/>
+            <a:lstStyle/>
+            <a:p>
+              <a:pPr algn="ctr"/>
+              <a:endParaRPr lang="es-ES"/>
+            </a:p>
+          </p:txBody>
+        </p:sp>
+        <p:sp>
+          <p:nvSpPr>
+            <p:cNvPr id="18" name="Elipse 17">
+              <a:extLst>
+                <a:ext uri="{FF2B5EF4-FFF2-40B4-BE49-F238E27FC236}">
+                  <a16:creationId xmlns:a16="http://schemas.microsoft.com/office/drawing/2014/main" id="{658847C7-A607-3363-7B58-7F44248AEEB5}"/>
+                </a:ext>
+              </a:extLst>
+            </p:cNvPr>
+            <p:cNvSpPr/>
+            <p:nvPr/>
+          </p:nvSpPr>
+          <p:spPr>
+            <a:xfrm>
+              <a:off x="5171872" y="4847450"/>
+              <a:ext cx="252919" cy="243192"/>
+            </a:xfrm>
+            <a:prstGeom prst="ellipse">
+              <a:avLst/>
+            </a:prstGeom>
+          </p:spPr>
+          <p:style>
+            <a:lnRef idx="2">
+              <a:schemeClr val="accent1">
+                <a:shade val="15000"/>
+              </a:schemeClr>
+            </a:lnRef>
+            <a:fillRef idx="1">
+              <a:schemeClr val="accent1"/>
+            </a:fillRef>
+            <a:effectRef idx="0">
+              <a:schemeClr val="accent1"/>
+            </a:effectRef>
+            <a:fontRef idx="minor">
+              <a:schemeClr val="lt1"/>
+            </a:fontRef>
+          </p:style>
+          <p:txBody>
+            <a:bodyPr rtlCol="0" anchor="ctr"/>
+            <a:lstStyle/>
+            <a:p>
+              <a:pPr algn="ctr"/>
+              <a:endParaRPr lang="es-ES"/>
+            </a:p>
+          </p:txBody>
+        </p:sp>
+        <p:sp>
+          <p:nvSpPr>
+            <p:cNvPr id="19" name="Elipse 18">
+              <a:extLst>
+                <a:ext uri="{FF2B5EF4-FFF2-40B4-BE49-F238E27FC236}">
+                  <a16:creationId xmlns:a16="http://schemas.microsoft.com/office/drawing/2014/main" id="{33AEA61F-FBEE-C43B-082A-2E87476F245D}"/>
+                </a:ext>
+              </a:extLst>
+            </p:cNvPr>
+            <p:cNvSpPr/>
+            <p:nvPr/>
+          </p:nvSpPr>
+          <p:spPr>
+            <a:xfrm>
+              <a:off x="7344382" y="4847450"/>
+              <a:ext cx="252919" cy="243192"/>
+            </a:xfrm>
+            <a:prstGeom prst="ellipse">
+              <a:avLst/>
+            </a:prstGeom>
+          </p:spPr>
+          <p:style>
+            <a:lnRef idx="2">
+              <a:schemeClr val="accent1">
+                <a:shade val="15000"/>
+              </a:schemeClr>
+            </a:lnRef>
+            <a:fillRef idx="1">
+              <a:schemeClr val="accent1"/>
+            </a:fillRef>
+            <a:effectRef idx="0">
+              <a:schemeClr val="accent1"/>
+            </a:effectRef>
+            <a:fontRef idx="minor">
+              <a:schemeClr val="lt1"/>
+            </a:fontRef>
+          </p:style>
+          <p:txBody>
+            <a:bodyPr rtlCol="0" anchor="ctr"/>
+            <a:lstStyle/>
+            <a:p>
+              <a:pPr algn="ctr"/>
+              <a:endParaRPr lang="es-ES"/>
+            </a:p>
+          </p:txBody>
+        </p:sp>
+        <p:sp>
+          <p:nvSpPr>
+            <p:cNvPr id="20" name="Elipse 19">
+              <a:extLst>
+                <a:ext uri="{FF2B5EF4-FFF2-40B4-BE49-F238E27FC236}">
+                  <a16:creationId xmlns:a16="http://schemas.microsoft.com/office/drawing/2014/main" id="{F3418F53-FF3D-1389-B45C-C847851063C1}"/>
+                </a:ext>
+              </a:extLst>
+            </p:cNvPr>
+            <p:cNvSpPr/>
+            <p:nvPr/>
+          </p:nvSpPr>
+          <p:spPr>
+            <a:xfrm>
+              <a:off x="6258127" y="4847450"/>
+              <a:ext cx="252919" cy="243192"/>
+            </a:xfrm>
+            <a:prstGeom prst="ellipse">
+              <a:avLst/>
+            </a:prstGeom>
+            <a:solidFill>
+              <a:srgbClr val="FF0000"/>
+            </a:solidFill>
+          </p:spPr>
+          <p:style>
+            <a:lnRef idx="2">
+              <a:schemeClr val="accent1">
+                <a:shade val="15000"/>
+              </a:schemeClr>
+            </a:lnRef>
+            <a:fillRef idx="1">
+              <a:schemeClr val="accent1"/>
+            </a:fillRef>
+            <a:effectRef idx="0">
+              <a:schemeClr val="accent1"/>
+            </a:effectRef>
+            <a:fontRef idx="minor">
+              <a:schemeClr val="lt1"/>
+            </a:fontRef>
+          </p:style>
+          <p:txBody>
+            <a:bodyPr rtlCol="0" anchor="ctr"/>
+            <a:lstStyle/>
+            <a:p>
+              <a:pPr algn="ctr"/>
+              <a:endParaRPr lang="es-ES"/>
+            </a:p>
+          </p:txBody>
+        </p:sp>
+        <p:sp>
+          <p:nvSpPr>
+            <p:cNvPr id="21" name="CuadroTexto 20">
+              <a:extLst>
+                <a:ext uri="{FF2B5EF4-FFF2-40B4-BE49-F238E27FC236}">
+                  <a16:creationId xmlns:a16="http://schemas.microsoft.com/office/drawing/2014/main" id="{A00BF47D-EBBA-849C-D7FE-5F9860ECB998}"/>
+                </a:ext>
+              </a:extLst>
+            </p:cNvPr>
+            <p:cNvSpPr txBox="1"/>
+            <p:nvPr/>
+          </p:nvSpPr>
+          <p:spPr>
+            <a:xfrm>
+              <a:off x="4058027" y="5090642"/>
+              <a:ext cx="308098" cy="369332"/>
+            </a:xfrm>
+            <a:prstGeom prst="rect">
+              <a:avLst/>
+            </a:prstGeom>
+            <a:noFill/>
+          </p:spPr>
+          <p:txBody>
+            <a:bodyPr wrap="none" rtlCol="0">
+              <a:spAutoFit/>
+            </a:bodyPr>
+            <a:lstStyle/>
+            <a:p>
+              <a:r>
+                <a:rPr lang="en-US" dirty="0"/>
+                <a:t>0</a:t>
+              </a:r>
+              <a:endParaRPr lang="es-ES" dirty="0"/>
+            </a:p>
+          </p:txBody>
+        </p:sp>
+        <p:sp>
+          <p:nvSpPr>
+            <p:cNvPr id="22" name="CuadroTexto 21">
+              <a:extLst>
+                <a:ext uri="{FF2B5EF4-FFF2-40B4-BE49-F238E27FC236}">
+                  <a16:creationId xmlns:a16="http://schemas.microsoft.com/office/drawing/2014/main" id="{8874484E-F204-19D8-7598-827C67E763CE}"/>
+                </a:ext>
+              </a:extLst>
+            </p:cNvPr>
+            <p:cNvSpPr txBox="1"/>
+            <p:nvPr/>
+          </p:nvSpPr>
+          <p:spPr>
+            <a:xfrm>
+              <a:off x="5144282" y="5090642"/>
+              <a:ext cx="308098" cy="369332"/>
+            </a:xfrm>
+            <a:prstGeom prst="rect">
+              <a:avLst/>
+            </a:prstGeom>
+            <a:noFill/>
+          </p:spPr>
+          <p:txBody>
+            <a:bodyPr wrap="none" rtlCol="0">
+              <a:spAutoFit/>
+            </a:bodyPr>
+            <a:lstStyle/>
+            <a:p>
+              <a:r>
+                <a:rPr lang="en-US" dirty="0"/>
+                <a:t>1</a:t>
+              </a:r>
+              <a:endParaRPr lang="es-ES" dirty="0"/>
+            </a:p>
+          </p:txBody>
+        </p:sp>
+        <p:sp>
+          <p:nvSpPr>
+            <p:cNvPr id="23" name="CuadroTexto 22">
+              <a:extLst>
+                <a:ext uri="{FF2B5EF4-FFF2-40B4-BE49-F238E27FC236}">
+                  <a16:creationId xmlns:a16="http://schemas.microsoft.com/office/drawing/2014/main" id="{2B31CE17-5C21-D3B4-6900-D49D330BD876}"/>
+                </a:ext>
+              </a:extLst>
+            </p:cNvPr>
+            <p:cNvSpPr txBox="1"/>
+            <p:nvPr/>
+          </p:nvSpPr>
+          <p:spPr>
+            <a:xfrm>
+              <a:off x="6258127" y="5090642"/>
+              <a:ext cx="308098" cy="369332"/>
+            </a:xfrm>
+            <a:prstGeom prst="rect">
+              <a:avLst/>
+            </a:prstGeom>
+            <a:noFill/>
+          </p:spPr>
+          <p:txBody>
+            <a:bodyPr wrap="none" rtlCol="0">
+              <a:spAutoFit/>
+            </a:bodyPr>
+            <a:lstStyle/>
+            <a:p>
+              <a:r>
+                <a:rPr lang="en-US" dirty="0"/>
+                <a:t>2</a:t>
+              </a:r>
+              <a:endParaRPr lang="es-ES" dirty="0"/>
+            </a:p>
+          </p:txBody>
+        </p:sp>
+        <p:sp>
+          <p:nvSpPr>
+            <p:cNvPr id="24" name="CuadroTexto 23">
+              <a:extLst>
+                <a:ext uri="{FF2B5EF4-FFF2-40B4-BE49-F238E27FC236}">
+                  <a16:creationId xmlns:a16="http://schemas.microsoft.com/office/drawing/2014/main" id="{62EC6594-A0F2-7476-6AB7-C58874DDA760}"/>
+                </a:ext>
+              </a:extLst>
+            </p:cNvPr>
+            <p:cNvSpPr txBox="1"/>
+            <p:nvPr/>
+          </p:nvSpPr>
+          <p:spPr>
+            <a:xfrm>
+              <a:off x="7371972" y="5090642"/>
+              <a:ext cx="308098" cy="369332"/>
+            </a:xfrm>
+            <a:prstGeom prst="rect">
+              <a:avLst/>
+            </a:prstGeom>
+            <a:noFill/>
+          </p:spPr>
+          <p:txBody>
+            <a:bodyPr wrap="none" rtlCol="0">
+              <a:spAutoFit/>
+            </a:bodyPr>
+            <a:lstStyle/>
+            <a:p>
+              <a:r>
+                <a:rPr lang="en-US" dirty="0"/>
+                <a:t>3</a:t>
+              </a:r>
+              <a:endParaRPr lang="es-ES" dirty="0"/>
+            </a:p>
+          </p:txBody>
+        </p:sp>
+        <p:sp>
+          <p:nvSpPr>
+            <p:cNvPr id="25" name="Trapecio 24">
+              <a:extLst>
+                <a:ext uri="{FF2B5EF4-FFF2-40B4-BE49-F238E27FC236}">
+                  <a16:creationId xmlns:a16="http://schemas.microsoft.com/office/drawing/2014/main" id="{64C78C4E-00F4-3004-2D31-6E62023B5F8D}"/>
+                </a:ext>
+              </a:extLst>
+            </p:cNvPr>
+            <p:cNvSpPr/>
+            <p:nvPr/>
+          </p:nvSpPr>
+          <p:spPr>
+            <a:xfrm>
+              <a:off x="4058027" y="2305455"/>
+              <a:ext cx="308098" cy="272375"/>
+            </a:xfrm>
+            <a:prstGeom prst="trapezoid">
+              <a:avLst/>
+            </a:prstGeom>
+          </p:spPr>
+          <p:style>
+            <a:lnRef idx="2">
+              <a:schemeClr val="accent1">
+                <a:shade val="15000"/>
+              </a:schemeClr>
+            </a:lnRef>
+            <a:fillRef idx="1">
+              <a:schemeClr val="accent1"/>
+            </a:fillRef>
+            <a:effectRef idx="0">
+              <a:schemeClr val="accent1"/>
+            </a:effectRef>
+            <a:fontRef idx="minor">
+              <a:schemeClr val="lt1"/>
+            </a:fontRef>
+          </p:style>
+          <p:txBody>
+            <a:bodyPr rtlCol="0" anchor="ctr"/>
+            <a:lstStyle/>
+            <a:p>
+              <a:pPr algn="ctr"/>
+              <a:endParaRPr lang="es-ES"/>
+            </a:p>
+          </p:txBody>
+        </p:sp>
+        <p:sp>
+          <p:nvSpPr>
+            <p:cNvPr id="26" name="Trapecio 25">
+              <a:extLst>
+                <a:ext uri="{FF2B5EF4-FFF2-40B4-BE49-F238E27FC236}">
+                  <a16:creationId xmlns:a16="http://schemas.microsoft.com/office/drawing/2014/main" id="{F24B0738-D59E-6E86-E68E-1FC0BD0B9646}"/>
+                </a:ext>
+              </a:extLst>
+            </p:cNvPr>
+            <p:cNvSpPr/>
+            <p:nvPr/>
+          </p:nvSpPr>
+          <p:spPr>
+            <a:xfrm>
+              <a:off x="5144225" y="2305453"/>
+              <a:ext cx="308098" cy="272375"/>
+            </a:xfrm>
+            <a:prstGeom prst="trapezoid">
+              <a:avLst/>
+            </a:prstGeom>
+          </p:spPr>
+          <p:style>
+            <a:lnRef idx="2">
+              <a:schemeClr val="accent1">
+                <a:shade val="15000"/>
+              </a:schemeClr>
+            </a:lnRef>
+            <a:fillRef idx="1">
+              <a:schemeClr val="accent1"/>
+            </a:fillRef>
+            <a:effectRef idx="0">
+              <a:schemeClr val="accent1"/>
+            </a:effectRef>
+            <a:fontRef idx="minor">
+              <a:schemeClr val="lt1"/>
+            </a:fontRef>
+          </p:style>
+          <p:txBody>
+            <a:bodyPr rtlCol="0" anchor="ctr"/>
+            <a:lstStyle/>
+            <a:p>
+              <a:pPr algn="ctr"/>
+              <a:endParaRPr lang="es-ES"/>
+            </a:p>
+          </p:txBody>
+        </p:sp>
+        <p:sp>
+          <p:nvSpPr>
+            <p:cNvPr id="27" name="Trapecio 26">
+              <a:extLst>
+                <a:ext uri="{FF2B5EF4-FFF2-40B4-BE49-F238E27FC236}">
+                  <a16:creationId xmlns:a16="http://schemas.microsoft.com/office/drawing/2014/main" id="{E135C980-E97A-F190-3059-5E33503EDC21}"/>
+                </a:ext>
+              </a:extLst>
+            </p:cNvPr>
+            <p:cNvSpPr/>
+            <p:nvPr/>
+          </p:nvSpPr>
+          <p:spPr>
+            <a:xfrm>
+              <a:off x="6258852" y="2305453"/>
+              <a:ext cx="308098" cy="272375"/>
+            </a:xfrm>
+            <a:prstGeom prst="trapezoid">
+              <a:avLst/>
+            </a:prstGeom>
+          </p:spPr>
+          <p:style>
+            <a:lnRef idx="2">
+              <a:schemeClr val="accent1">
+                <a:shade val="15000"/>
+              </a:schemeClr>
+            </a:lnRef>
+            <a:fillRef idx="1">
+              <a:schemeClr val="accent1"/>
+            </a:fillRef>
+            <a:effectRef idx="0">
+              <a:schemeClr val="accent1"/>
+            </a:effectRef>
+            <a:fontRef idx="minor">
+              <a:schemeClr val="lt1"/>
+            </a:fontRef>
+          </p:style>
+          <p:txBody>
+            <a:bodyPr rtlCol="0" anchor="ctr"/>
+            <a:lstStyle/>
+            <a:p>
+              <a:pPr algn="ctr"/>
+              <a:endParaRPr lang="es-ES"/>
+            </a:p>
+          </p:txBody>
+        </p:sp>
+      </p:grpSp>
       <p:pic>
         <p:nvPicPr>
           <p:cNvPr id="29" name="Imagen 28">
@@ -12259,7 +12743,7 @@
         <p:spPr>
           <a:xfrm>
             <a:off x="1157591" y="3120077"/>
-            <a:ext cx="1136322" cy="1200329"/>
+            <a:ext cx="1404026" cy="1938992"/>
           </a:xfrm>
           <a:prstGeom prst="rect">
             <a:avLst/>
@@ -12292,6 +12776,18 @@
             <a:r>
               <a:rPr lang="en-US" sz="2400" dirty="0"/>
               <a:t>F = 4</a:t>
+            </a:r>
+          </a:p>
+          <a:p>
+            <a:r>
+              <a:rPr lang="en-US" sz="2400" dirty="0"/>
+              <a:t>D = 1</a:t>
+            </a:r>
+          </a:p>
+          <a:p>
+            <a:r>
+              <a:rPr lang="en-US" sz="2400" dirty="0"/>
+              <a:t>Delta=1</a:t>
             </a:r>
             <a:endParaRPr lang="es-ES" sz="2400" dirty="0"/>
           </a:p>
@@ -13943,7 +14439,7 @@
             </a:r>
             <a:r>
               <a:rPr lang="en-US" sz="3600" dirty="0" err="1"/>
-              <a:t>disntacia</a:t>
+              <a:t>distancia</a:t>
             </a:r>
             <a:r>
               <a:rPr lang="en-US" sz="3600" dirty="0"/>
@@ -15141,6 +15637,57 @@
           </a:prstGeom>
         </p:spPr>
       </p:pic>
+      <p:sp>
+        <p:nvSpPr>
+          <p:cNvPr id="3" name="Elipse 2">
+            <a:extLst>
+              <a:ext uri="{FF2B5EF4-FFF2-40B4-BE49-F238E27FC236}">
+                <a16:creationId xmlns:a16="http://schemas.microsoft.com/office/drawing/2014/main" id="{7B4140DB-0F80-CD06-21C3-82974EEAFBAA}"/>
+              </a:ext>
+            </a:extLst>
+          </p:cNvPr>
+          <p:cNvSpPr/>
+          <p:nvPr/>
+        </p:nvSpPr>
+        <p:spPr>
+          <a:xfrm>
+            <a:off x="3047189" y="1767750"/>
+            <a:ext cx="2118198" cy="2055220"/>
+          </a:xfrm>
+          <a:prstGeom prst="ellipse">
+            <a:avLst/>
+          </a:prstGeom>
+          <a:solidFill>
+            <a:schemeClr val="accent1">
+              <a:alpha val="32000"/>
+            </a:schemeClr>
+          </a:solidFill>
+        </p:spPr>
+        <p:style>
+          <a:lnRef idx="2">
+            <a:schemeClr val="accent1">
+              <a:shade val="15000"/>
+            </a:schemeClr>
+          </a:lnRef>
+          <a:fillRef idx="1">
+            <a:schemeClr val="accent1"/>
+          </a:fillRef>
+          <a:effectRef idx="0">
+            <a:schemeClr val="accent1"/>
+          </a:effectRef>
+          <a:fontRef idx="minor">
+            <a:schemeClr val="lt1"/>
+          </a:fontRef>
+        </p:style>
+        <p:txBody>
+          <a:bodyPr rtlCol="0" anchor="ctr"/>
+          <a:lstStyle/>
+          <a:p>
+            <a:pPr algn="ctr"/>
+            <a:endParaRPr lang="es-ES"/>
+          </a:p>
+        </p:txBody>
+      </p:sp>
     </p:spTree>
     <p:extLst>
       <p:ext uri="{BB962C8B-B14F-4D97-AF65-F5344CB8AC3E}">
@@ -15488,8 +16035,8 @@
           <a:lstStyle/>
           <a:p>
             <a:r>
-              <a:rPr lang="en-US" sz="3600" dirty="0" err="1"/>
-              <a:t>Llegamos</a:t>
+              <a:rPr lang="en-US" sz="3600" dirty="0"/>
+              <a:t>Comparación</a:t>
             </a:r>
             <a:endParaRPr lang="es-ES" sz="3600" dirty="0"/>
           </a:p>
@@ -15718,7 +16265,13 @@
     </p:bg>
     <p:spTree>
       <p:nvGrpSpPr>
-        <p:cNvPr id="1" name=""/>
+        <p:cNvPr id="1" name="">
+          <a:extLst>
+            <a:ext uri="{FF2B5EF4-FFF2-40B4-BE49-F238E27FC236}">
+              <a16:creationId xmlns:a16="http://schemas.microsoft.com/office/drawing/2014/main" id="{D211BF41-FD4C-A073-D5CB-DFAFD916CD08}"/>
+            </a:ext>
+          </a:extLst>
+        </p:cNvPr>
         <p:cNvGrpSpPr/>
         <p:nvPr/>
       </p:nvGrpSpPr>
@@ -15735,7 +16288,7 @@
           <p:cNvPr id="2" name="Título 1">
             <a:extLst>
               <a:ext uri="{FF2B5EF4-FFF2-40B4-BE49-F238E27FC236}">
-                <a16:creationId xmlns:a16="http://schemas.microsoft.com/office/drawing/2014/main" id="{B378398C-0D14-BDC7-0118-39E480D98933}"/>
+                <a16:creationId xmlns:a16="http://schemas.microsoft.com/office/drawing/2014/main" id="{4BC55F6D-F427-DD21-DF80-A9EF3CEF1250}"/>
               </a:ext>
             </a:extLst>
           </p:cNvPr>
@@ -15754,16 +16307,12 @@
           <a:lstStyle/>
           <a:p>
             <a:r>
+              <a:rPr lang="en-US" sz="3600" dirty="0" err="1"/>
+              <a:t>Ejemplo</a:t>
+            </a:r>
+            <a:r>
               <a:rPr lang="en-US" sz="3600" dirty="0"/>
-              <a:t>Como </a:t>
-            </a:r>
-            <a:r>
-              <a:rPr lang="en-US" sz="3600" dirty="0" err="1"/>
-              <a:t>sigue</a:t>
-            </a:r>
-            <a:r>
-              <a:rPr lang="en-US" sz="3600" dirty="0"/>
-              <a:t>…</a:t>
+              <a:t> 4</a:t>
             </a:r>
             <a:endParaRPr lang="es-ES" sz="3600" dirty="0"/>
           </a:p>
@@ -15774,7 +16323,7 @@
           <p:cNvPr id="4" name="Marcador de número de diapositiva 3">
             <a:extLst>
               <a:ext uri="{FF2B5EF4-FFF2-40B4-BE49-F238E27FC236}">
-                <a16:creationId xmlns:a16="http://schemas.microsoft.com/office/drawing/2014/main" id="{2DC60E05-D5CF-2F33-ECCF-C77F3E20B961}"/>
+                <a16:creationId xmlns:a16="http://schemas.microsoft.com/office/drawing/2014/main" id="{4033A1AF-769D-5F1D-8107-7435F47E8D88}"/>
               </a:ext>
             </a:extLst>
           </p:cNvPr>
@@ -15800,101 +16349,139 @@
       </p:sp>
       <p:sp>
         <p:nvSpPr>
-          <p:cNvPr id="3" name="Título 1">
-            <a:extLst>
-              <a:ext uri="{FF2B5EF4-FFF2-40B4-BE49-F238E27FC236}">
-                <a16:creationId xmlns:a16="http://schemas.microsoft.com/office/drawing/2014/main" id="{E00EFC8A-4214-84CE-8664-43C5DE7AA715}"/>
-              </a:ext>
-            </a:extLst>
-          </p:cNvPr>
-          <p:cNvSpPr txBox="1">
-            <a:spLocks/>
-          </p:cNvSpPr>
+          <p:cNvPr id="6" name="CuadroTexto 5">
+            <a:extLst>
+              <a:ext uri="{FF2B5EF4-FFF2-40B4-BE49-F238E27FC236}">
+                <a16:creationId xmlns:a16="http://schemas.microsoft.com/office/drawing/2014/main" id="{FA35D9CB-063D-BA51-8557-A2D7AA5F9417}"/>
+              </a:ext>
+            </a:extLst>
+          </p:cNvPr>
+          <p:cNvSpPr txBox="1"/>
           <p:nvPr/>
         </p:nvSpPr>
         <p:spPr>
           <a:xfrm>
-            <a:off x="838199" y="1820864"/>
-            <a:ext cx="10515600" cy="4414836"/>
+            <a:off x="3047189" y="3244334"/>
+            <a:ext cx="6094378" cy="369332"/>
+          </a:xfrm>
+          <a:prstGeom prst="rect">
+            <a:avLst/>
+          </a:prstGeom>
+          <a:noFill/>
+        </p:spPr>
+        <p:txBody>
+          <a:bodyPr wrap="square">
+            <a:spAutoFit/>
+          </a:bodyPr>
+          <a:lstStyle/>
+          <a:p>
+            <a:r>
+              <a:rPr lang="es-ES" b="0" dirty="0">
+                <a:solidFill>
+                  <a:srgbClr val="D4D4D4"/>
+                </a:solidFill>
+                <a:effectLst/>
+                <a:latin typeface="Consolas" panose="020B0609020204030204" pitchFamily="49" charset="0"/>
+              </a:rPr>
+              <a:t>*(</a:t>
+            </a:r>
+            <a:r>
+              <a:rPr lang="es-ES" b="0" dirty="0">
+                <a:solidFill>
+                  <a:srgbClr val="C8C8C8"/>
+                </a:solidFill>
+                <a:effectLst/>
+                <a:latin typeface="Consolas" panose="020B0609020204030204" pitchFamily="49" charset="0"/>
+              </a:rPr>
+              <a:t>n</a:t>
+            </a:r>
+            <a:r>
+              <a:rPr lang="es-ES" b="0" dirty="0">
+                <a:solidFill>
+                  <a:srgbClr val="D4D4D4"/>
+                </a:solidFill>
+                <a:effectLst/>
+                <a:latin typeface="Consolas" panose="020B0609020204030204" pitchFamily="49" charset="0"/>
+              </a:rPr>
+              <a:t>-</a:t>
+            </a:r>
+            <a:r>
+              <a:rPr lang="es-ES" b="0" dirty="0">
+                <a:solidFill>
+                  <a:srgbClr val="B5CEA8"/>
+                </a:solidFill>
+                <a:effectLst/>
+                <a:latin typeface="Consolas" panose="020B0609020204030204" pitchFamily="49" charset="0"/>
+              </a:rPr>
+              <a:t>1</a:t>
+            </a:r>
+            <a:r>
+              <a:rPr lang="es-ES" b="0" dirty="0">
+                <a:solidFill>
+                  <a:srgbClr val="D4D4D4"/>
+                </a:solidFill>
+                <a:effectLst/>
+                <a:latin typeface="Consolas" panose="020B0609020204030204" pitchFamily="49" charset="0"/>
+              </a:rPr>
+              <a:t>-</a:t>
+            </a:r>
+            <a:r>
+              <a:rPr lang="es-ES" b="0" dirty="0">
+                <a:solidFill>
+                  <a:srgbClr val="C8C8C8"/>
+                </a:solidFill>
+                <a:effectLst/>
+                <a:latin typeface="Consolas" panose="020B0609020204030204" pitchFamily="49" charset="0"/>
+              </a:rPr>
+              <a:t>i</a:t>
+            </a:r>
+            <a:r>
+              <a:rPr lang="es-ES" b="0" dirty="0">
+                <a:solidFill>
+                  <a:srgbClr val="D4D4D4"/>
+                </a:solidFill>
+                <a:effectLst/>
+                <a:latin typeface="Consolas" panose="020B0609020204030204" pitchFamily="49" charset="0"/>
+              </a:rPr>
+              <a:t>)</a:t>
+            </a:r>
+          </a:p>
+        </p:txBody>
+      </p:sp>
+      <p:pic>
+        <p:nvPicPr>
+          <p:cNvPr id="7" name="Imagen 6">
+            <a:extLst>
+              <a:ext uri="{FF2B5EF4-FFF2-40B4-BE49-F238E27FC236}">
+                <a16:creationId xmlns:a16="http://schemas.microsoft.com/office/drawing/2014/main" id="{BCF9F343-9474-28C9-6137-119DE06C7045}"/>
+              </a:ext>
+            </a:extLst>
+          </p:cNvPr>
+          <p:cNvPicPr>
+            <a:picLocks noChangeAspect="1"/>
+          </p:cNvPicPr>
+          <p:nvPr/>
+        </p:nvPicPr>
+        <p:blipFill>
+          <a:blip r:embed="rId4"/>
+          <a:stretch>
+            <a:fillRect/>
+          </a:stretch>
+        </p:blipFill>
+        <p:spPr>
+          <a:xfrm>
+            <a:off x="3047189" y="1291339"/>
+            <a:ext cx="6094378" cy="4820238"/>
           </a:xfrm>
           <a:prstGeom prst="rect">
             <a:avLst/>
           </a:prstGeom>
         </p:spPr>
-        <p:txBody>
-          <a:bodyPr vert="horz" lIns="91440" tIns="45720" rIns="91440" bIns="45720" rtlCol="0" anchor="t" anchorCtr="0">
-            <a:noAutofit/>
-          </a:bodyPr>
-          <a:lstStyle>
-            <a:defPPr>
-              <a:defRPr lang="es-ES"/>
-            </a:defPPr>
-            <a:lvl1pPr marL="685800" indent="-685800">
-              <a:lnSpc>
-                <a:spcPct val="90000"/>
-              </a:lnSpc>
-              <a:spcBef>
-                <a:spcPct val="0"/>
-              </a:spcBef>
-              <a:buFont typeface="Arial" panose="020B0604020202020204" pitchFamily="34" charset="0"/>
-              <a:buChar char="•"/>
-              <a:defRPr sz="3200">
-                <a:latin typeface="+mj-lt"/>
-                <a:ea typeface="+mj-ea"/>
-                <a:cs typeface="+mj-cs"/>
-              </a:defRPr>
-            </a:lvl1pPr>
-          </a:lstStyle>
-          <a:p>
-            <a:r>
-              <a:rPr lang="es-ES" sz="2800" dirty="0"/>
-              <a:t>Verificar ecuaciones para Implementación en el formato propuesto.</a:t>
-            </a:r>
-          </a:p>
-          <a:p>
-            <a:endParaRPr lang="es-ES" sz="2800" dirty="0"/>
-          </a:p>
-          <a:p>
-            <a:r>
-              <a:rPr lang="es-ES" sz="2800" dirty="0"/>
-              <a:t>Realizar análisis de precisión y errores de propagación.</a:t>
-            </a:r>
-          </a:p>
-          <a:p>
-            <a:endParaRPr lang="es-ES" sz="2800" dirty="0"/>
-          </a:p>
-          <a:p>
-            <a:r>
-              <a:rPr lang="es-ES" sz="2800" dirty="0"/>
-              <a:t>Analizar la factibilidad de desarrollo por etapas para incrementar la cantidad de </a:t>
-            </a:r>
-            <a:r>
-              <a:rPr lang="es-ES" sz="2800" dirty="0" err="1"/>
-              <a:t>Qbits</a:t>
-            </a:r>
-            <a:r>
-              <a:rPr lang="es-ES" sz="2800" dirty="0"/>
-              <a:t> (muestras).</a:t>
-            </a:r>
-          </a:p>
-          <a:p>
-            <a:endParaRPr lang="es-ES" sz="2800" dirty="0"/>
-          </a:p>
-          <a:p>
-            <a:r>
-              <a:rPr lang="es-ES" sz="2800" dirty="0"/>
-              <a:t>Ensayos para confirmar tiempos de ejecución y realizar análisis comparativo con sistemas clásicos.</a:t>
-            </a:r>
-          </a:p>
-          <a:p>
-            <a:endParaRPr lang="es-ES" sz="2800" dirty="0"/>
-          </a:p>
-        </p:txBody>
-      </p:sp>
+      </p:pic>
     </p:spTree>
     <p:extLst>
       <p:ext uri="{BB962C8B-B14F-4D97-AF65-F5344CB8AC3E}">
-        <p14:creationId xmlns:p14="http://schemas.microsoft.com/office/powerpoint/2010/main" val="1272269525"/>
+        <p14:creationId xmlns:p14="http://schemas.microsoft.com/office/powerpoint/2010/main" val="2490679095"/>
       </p:ext>
     </p:extLst>
   </p:cSld>
@@ -15924,7 +16511,13 @@
     </p:bg>
     <p:spTree>
       <p:nvGrpSpPr>
-        <p:cNvPr id="1" name=""/>
+        <p:cNvPr id="1" name="">
+          <a:extLst>
+            <a:ext uri="{FF2B5EF4-FFF2-40B4-BE49-F238E27FC236}">
+              <a16:creationId xmlns:a16="http://schemas.microsoft.com/office/drawing/2014/main" id="{9FC14BDB-5D5B-0CF7-3B5F-4A2B0725B6CA}"/>
+            </a:ext>
+          </a:extLst>
+        </p:cNvPr>
         <p:cNvGrpSpPr/>
         <p:nvPr/>
       </p:nvGrpSpPr>
@@ -15938,10 +16531,10 @@
       </p:grpSpPr>
       <p:sp>
         <p:nvSpPr>
-          <p:cNvPr id="7" name="Título 6">
-            <a:extLst>
-              <a:ext uri="{FF2B5EF4-FFF2-40B4-BE49-F238E27FC236}">
-                <a16:creationId xmlns:a16="http://schemas.microsoft.com/office/drawing/2014/main" id="{115AEDCA-5AC7-84A4-B996-B975D283F825}"/>
+          <p:cNvPr id="2" name="Título 1">
+            <a:extLst>
+              <a:ext uri="{FF2B5EF4-FFF2-40B4-BE49-F238E27FC236}">
+                <a16:creationId xmlns:a16="http://schemas.microsoft.com/office/drawing/2014/main" id="{0D857FA1-C60B-CC0E-B6B3-043ABD55460B}"/>
               </a:ext>
             </a:extLst>
           </p:cNvPr>
@@ -15952,57 +16545,22 @@
             <p:ph type="title"/>
           </p:nvPr>
         </p:nvSpPr>
-        <p:spPr>
-          <a:xfrm>
-            <a:off x="750651" y="3751501"/>
-            <a:ext cx="10515600" cy="1335147"/>
-          </a:xfrm>
-        </p:spPr>
+        <p:spPr/>
         <p:txBody>
           <a:bodyPr>
-            <a:normAutofit fontScale="90000"/>
+            <a:normAutofit/>
           </a:bodyPr>
           <a:lstStyle/>
           <a:p>
-            <a:pPr algn="ctr"/>
-            <a:r>
-              <a:rPr lang="en-US" dirty="0"/>
-              <a:t>Las </a:t>
-            </a:r>
-            <a:r>
-              <a:rPr lang="en-US" dirty="0" err="1"/>
-              <a:t>preguntas</a:t>
-            </a:r>
-            <a:r>
-              <a:rPr lang="en-US" dirty="0"/>
-              <a:t>…</a:t>
-            </a:r>
-            <a:br>
-              <a:rPr lang="en-US" dirty="0"/>
-            </a:br>
-            <a:r>
-              <a:rPr lang="en-US" dirty="0"/>
-              <a:t>En </a:t>
-            </a:r>
-            <a:r>
-              <a:rPr lang="en-US" dirty="0" err="1"/>
-              <a:t>el</a:t>
-            </a:r>
-            <a:r>
-              <a:rPr lang="en-US" dirty="0"/>
-              <a:t> workshop.</a:t>
-            </a:r>
-            <a:br>
-              <a:rPr lang="en-US" dirty="0"/>
-            </a:br>
-            <a:br>
-              <a:rPr lang="en-US" dirty="0"/>
-            </a:br>
-            <a:r>
-              <a:rPr lang="en-US" sz="4000" dirty="0"/>
-              <a:t>https://github.com/martinpaurabe/PracticaQC.git</a:t>
-            </a:r>
-            <a:endParaRPr lang="es-ES" dirty="0"/>
+            <a:r>
+              <a:rPr lang="en-US" sz="3600" dirty="0" err="1"/>
+              <a:t>Ejemplo</a:t>
+            </a:r>
+            <a:r>
+              <a:rPr lang="en-US" sz="3600" dirty="0"/>
+              <a:t> 4</a:t>
+            </a:r>
+            <a:endParaRPr lang="es-ES" sz="3600" dirty="0"/>
           </a:p>
         </p:txBody>
       </p:sp>
@@ -16011,7 +16569,7 @@
           <p:cNvPr id="4" name="Marcador de número de diapositiva 3">
             <a:extLst>
               <a:ext uri="{FF2B5EF4-FFF2-40B4-BE49-F238E27FC236}">
-                <a16:creationId xmlns:a16="http://schemas.microsoft.com/office/drawing/2014/main" id="{2DC60E05-D5CF-2F33-ECCF-C77F3E20B961}"/>
+                <a16:creationId xmlns:a16="http://schemas.microsoft.com/office/drawing/2014/main" id="{3BBE052D-4A24-0BF2-E4FF-2C12733E8859}"/>
               </a:ext>
             </a:extLst>
           </p:cNvPr>
@@ -16035,10 +16593,171 @@
           </a:p>
         </p:txBody>
       </p:sp>
+      <p:sp>
+        <p:nvSpPr>
+          <p:cNvPr id="6" name="CuadroTexto 5">
+            <a:extLst>
+              <a:ext uri="{FF2B5EF4-FFF2-40B4-BE49-F238E27FC236}">
+                <a16:creationId xmlns:a16="http://schemas.microsoft.com/office/drawing/2014/main" id="{94A118F7-90C8-79E4-53DF-148F4E61C344}"/>
+              </a:ext>
+            </a:extLst>
+          </p:cNvPr>
+          <p:cNvSpPr txBox="1"/>
+          <p:nvPr/>
+        </p:nvSpPr>
+        <p:spPr>
+          <a:xfrm>
+            <a:off x="3047189" y="3244334"/>
+            <a:ext cx="6094378" cy="369332"/>
+          </a:xfrm>
+          <a:prstGeom prst="rect">
+            <a:avLst/>
+          </a:prstGeom>
+          <a:noFill/>
+        </p:spPr>
+        <p:txBody>
+          <a:bodyPr wrap="square">
+            <a:spAutoFit/>
+          </a:bodyPr>
+          <a:lstStyle/>
+          <a:p>
+            <a:r>
+              <a:rPr lang="es-ES" b="0" dirty="0">
+                <a:solidFill>
+                  <a:srgbClr val="D4D4D4"/>
+                </a:solidFill>
+                <a:effectLst/>
+                <a:latin typeface="Consolas" panose="020B0609020204030204" pitchFamily="49" charset="0"/>
+              </a:rPr>
+              <a:t>*(</a:t>
+            </a:r>
+            <a:r>
+              <a:rPr lang="es-ES" b="0" dirty="0">
+                <a:solidFill>
+                  <a:srgbClr val="C8C8C8"/>
+                </a:solidFill>
+                <a:effectLst/>
+                <a:latin typeface="Consolas" panose="020B0609020204030204" pitchFamily="49" charset="0"/>
+              </a:rPr>
+              <a:t>n</a:t>
+            </a:r>
+            <a:r>
+              <a:rPr lang="es-ES" b="0" dirty="0">
+                <a:solidFill>
+                  <a:srgbClr val="D4D4D4"/>
+                </a:solidFill>
+                <a:effectLst/>
+                <a:latin typeface="Consolas" panose="020B0609020204030204" pitchFamily="49" charset="0"/>
+              </a:rPr>
+              <a:t>-</a:t>
+            </a:r>
+            <a:r>
+              <a:rPr lang="es-ES" b="0" dirty="0">
+                <a:solidFill>
+                  <a:srgbClr val="B5CEA8"/>
+                </a:solidFill>
+                <a:effectLst/>
+                <a:latin typeface="Consolas" panose="020B0609020204030204" pitchFamily="49" charset="0"/>
+              </a:rPr>
+              <a:t>1</a:t>
+            </a:r>
+            <a:r>
+              <a:rPr lang="es-ES" b="0" dirty="0">
+                <a:solidFill>
+                  <a:srgbClr val="D4D4D4"/>
+                </a:solidFill>
+                <a:effectLst/>
+                <a:latin typeface="Consolas" panose="020B0609020204030204" pitchFamily="49" charset="0"/>
+              </a:rPr>
+              <a:t>-</a:t>
+            </a:r>
+            <a:r>
+              <a:rPr lang="es-ES" b="0" dirty="0">
+                <a:solidFill>
+                  <a:srgbClr val="C8C8C8"/>
+                </a:solidFill>
+                <a:effectLst/>
+                <a:latin typeface="Consolas" panose="020B0609020204030204" pitchFamily="49" charset="0"/>
+              </a:rPr>
+              <a:t>i</a:t>
+            </a:r>
+            <a:r>
+              <a:rPr lang="es-ES" b="0" dirty="0">
+                <a:solidFill>
+                  <a:srgbClr val="D4D4D4"/>
+                </a:solidFill>
+                <a:effectLst/>
+                <a:latin typeface="Consolas" panose="020B0609020204030204" pitchFamily="49" charset="0"/>
+              </a:rPr>
+              <a:t>)</a:t>
+            </a:r>
+          </a:p>
+        </p:txBody>
+      </p:sp>
+      <p:pic>
+        <p:nvPicPr>
+          <p:cNvPr id="9" name="Imagen 8">
+            <a:extLst>
+              <a:ext uri="{FF2B5EF4-FFF2-40B4-BE49-F238E27FC236}">
+                <a16:creationId xmlns:a16="http://schemas.microsoft.com/office/drawing/2014/main" id="{CF1E5361-FDDC-3487-BB10-55DFBB5E49BA}"/>
+              </a:ext>
+            </a:extLst>
+          </p:cNvPr>
+          <p:cNvPicPr>
+            <a:picLocks noChangeAspect="1"/>
+          </p:cNvPicPr>
+          <p:nvPr/>
+        </p:nvPicPr>
+        <p:blipFill>
+          <a:blip r:embed="rId4"/>
+          <a:stretch>
+            <a:fillRect/>
+          </a:stretch>
+        </p:blipFill>
+        <p:spPr>
+          <a:xfrm>
+            <a:off x="838200" y="1690688"/>
+            <a:ext cx="5171328" cy="4059492"/>
+          </a:xfrm>
+          <a:prstGeom prst="rect">
+            <a:avLst/>
+          </a:prstGeom>
+        </p:spPr>
+      </p:pic>
+      <p:pic>
+        <p:nvPicPr>
+          <p:cNvPr id="5" name="Imagen 4">
+            <a:extLst>
+              <a:ext uri="{FF2B5EF4-FFF2-40B4-BE49-F238E27FC236}">
+                <a16:creationId xmlns:a16="http://schemas.microsoft.com/office/drawing/2014/main" id="{FA2DDF54-42F1-EAFF-B1A5-83A93457EF16}"/>
+              </a:ext>
+            </a:extLst>
+          </p:cNvPr>
+          <p:cNvPicPr>
+            <a:picLocks noChangeAspect="1"/>
+          </p:cNvPicPr>
+          <p:nvPr/>
+        </p:nvPicPr>
+        <p:blipFill>
+          <a:blip r:embed="rId5"/>
+          <a:stretch>
+            <a:fillRect/>
+          </a:stretch>
+        </p:blipFill>
+        <p:spPr>
+          <a:xfrm>
+            <a:off x="6470964" y="1690688"/>
+            <a:ext cx="5075768" cy="4076191"/>
+          </a:xfrm>
+          <a:prstGeom prst="rect">
+            <a:avLst/>
+          </a:prstGeom>
+        </p:spPr>
+      </p:pic>
     </p:spTree>
     <p:extLst>
       <p:ext uri="{BB962C8B-B14F-4D97-AF65-F5344CB8AC3E}">
-        <p14:creationId xmlns:p14="http://schemas.microsoft.com/office/powerpoint/2010/main" val="2632946392"/>
+        <p14:creationId xmlns:p14="http://schemas.microsoft.com/office/powerpoint/2010/main" val="3530014737"/>
       </p:ext>
     </p:extLst>
   </p:cSld>
@@ -16082,6 +16801,356 @@
       </p:grpSpPr>
       <p:sp>
         <p:nvSpPr>
+          <p:cNvPr id="2" name="Título 1">
+            <a:extLst>
+              <a:ext uri="{FF2B5EF4-FFF2-40B4-BE49-F238E27FC236}">
+                <a16:creationId xmlns:a16="http://schemas.microsoft.com/office/drawing/2014/main" id="{B378398C-0D14-BDC7-0118-39E480D98933}"/>
+              </a:ext>
+            </a:extLst>
+          </p:cNvPr>
+          <p:cNvSpPr>
+            <a:spLocks noGrp="1"/>
+          </p:cNvSpPr>
+          <p:nvPr>
+            <p:ph type="title"/>
+          </p:nvPr>
+        </p:nvSpPr>
+        <p:spPr/>
+        <p:txBody>
+          <a:bodyPr>
+            <a:normAutofit/>
+          </a:bodyPr>
+          <a:lstStyle/>
+          <a:p>
+            <a:r>
+              <a:rPr lang="en-US" sz="3600" dirty="0"/>
+              <a:t>Como </a:t>
+            </a:r>
+            <a:r>
+              <a:rPr lang="en-US" sz="3600" dirty="0" err="1"/>
+              <a:t>sigue</a:t>
+            </a:r>
+            <a:r>
+              <a:rPr lang="en-US" sz="3600" dirty="0"/>
+              <a:t>…</a:t>
+            </a:r>
+            <a:endParaRPr lang="es-ES" sz="3600" dirty="0"/>
+          </a:p>
+        </p:txBody>
+      </p:sp>
+      <p:sp>
+        <p:nvSpPr>
+          <p:cNvPr id="4" name="Marcador de número de diapositiva 3">
+            <a:extLst>
+              <a:ext uri="{FF2B5EF4-FFF2-40B4-BE49-F238E27FC236}">
+                <a16:creationId xmlns:a16="http://schemas.microsoft.com/office/drawing/2014/main" id="{2DC60E05-D5CF-2F33-ECCF-C77F3E20B961}"/>
+              </a:ext>
+            </a:extLst>
+          </p:cNvPr>
+          <p:cNvSpPr>
+            <a:spLocks noGrp="1"/>
+          </p:cNvSpPr>
+          <p:nvPr>
+            <p:ph type="sldNum" sz="quarter" idx="12"/>
+          </p:nvPr>
+        </p:nvSpPr>
+        <p:spPr/>
+        <p:txBody>
+          <a:bodyPr/>
+          <a:lstStyle/>
+          <a:p>
+            <a:fld id="{A2C3E7BB-DCAF-465F-9DB1-38B39D06FDD5}" type="slidenum">
+              <a:rPr lang="es-ES" smtClean="0"/>
+              <a:t>25</a:t>
+            </a:fld>
+            <a:endParaRPr lang="es-ES" dirty="0"/>
+          </a:p>
+        </p:txBody>
+      </p:sp>
+      <p:sp>
+        <p:nvSpPr>
+          <p:cNvPr id="3" name="Título 1">
+            <a:extLst>
+              <a:ext uri="{FF2B5EF4-FFF2-40B4-BE49-F238E27FC236}">
+                <a16:creationId xmlns:a16="http://schemas.microsoft.com/office/drawing/2014/main" id="{E00EFC8A-4214-84CE-8664-43C5DE7AA715}"/>
+              </a:ext>
+            </a:extLst>
+          </p:cNvPr>
+          <p:cNvSpPr txBox="1">
+            <a:spLocks/>
+          </p:cNvSpPr>
+          <p:nvPr/>
+        </p:nvSpPr>
+        <p:spPr>
+          <a:xfrm>
+            <a:off x="838199" y="1820864"/>
+            <a:ext cx="10515600" cy="4414836"/>
+          </a:xfrm>
+          <a:prstGeom prst="rect">
+            <a:avLst/>
+          </a:prstGeom>
+        </p:spPr>
+        <p:txBody>
+          <a:bodyPr vert="horz" lIns="91440" tIns="45720" rIns="91440" bIns="45720" rtlCol="0" anchor="t" anchorCtr="0">
+            <a:noAutofit/>
+          </a:bodyPr>
+          <a:lstStyle>
+            <a:defPPr>
+              <a:defRPr lang="es-ES"/>
+            </a:defPPr>
+            <a:lvl1pPr marL="685800" indent="-685800">
+              <a:lnSpc>
+                <a:spcPct val="90000"/>
+              </a:lnSpc>
+              <a:spcBef>
+                <a:spcPct val="0"/>
+              </a:spcBef>
+              <a:buFont typeface="Arial" panose="020B0604020202020204" pitchFamily="34" charset="0"/>
+              <a:buChar char="•"/>
+              <a:defRPr sz="3200">
+                <a:latin typeface="+mj-lt"/>
+                <a:ea typeface="+mj-ea"/>
+                <a:cs typeface="+mj-cs"/>
+              </a:defRPr>
+            </a:lvl1pPr>
+          </a:lstStyle>
+          <a:p>
+            <a:r>
+              <a:rPr lang="es-ES" sz="2800" dirty="0"/>
+              <a:t>Verificar ecuaciones para Implementación en el formato propuesto.</a:t>
+            </a:r>
+          </a:p>
+          <a:p>
+            <a:endParaRPr lang="es-ES" sz="2800" dirty="0"/>
+          </a:p>
+          <a:p>
+            <a:r>
+              <a:rPr lang="es-ES" sz="2800" dirty="0"/>
+              <a:t>Realizar análisis de precisión y errores de propagación.</a:t>
+            </a:r>
+          </a:p>
+          <a:p>
+            <a:endParaRPr lang="es-ES" sz="2800" dirty="0"/>
+          </a:p>
+          <a:p>
+            <a:r>
+              <a:rPr lang="es-ES" sz="2800" dirty="0"/>
+              <a:t>Analizar la factibilidad de desarrollo por etapas para incrementar la cantidad de </a:t>
+            </a:r>
+            <a:r>
+              <a:rPr lang="es-ES" sz="2800" dirty="0" err="1"/>
+              <a:t>Qbits</a:t>
+            </a:r>
+            <a:r>
+              <a:rPr lang="es-ES" sz="2800" dirty="0"/>
+              <a:t> (muestras).</a:t>
+            </a:r>
+          </a:p>
+          <a:p>
+            <a:endParaRPr lang="es-ES" sz="2800" dirty="0"/>
+          </a:p>
+          <a:p>
+            <a:r>
+              <a:rPr lang="es-ES" sz="2800" dirty="0"/>
+              <a:t>Ensayos para confirmar tiempos de ejecución y realizar análisis comparativo con sistemas clásicos.</a:t>
+            </a:r>
+          </a:p>
+          <a:p>
+            <a:endParaRPr lang="es-ES" sz="2800" dirty="0"/>
+          </a:p>
+        </p:txBody>
+      </p:sp>
+    </p:spTree>
+    <p:extLst>
+      <p:ext uri="{BB962C8B-B14F-4D97-AF65-F5344CB8AC3E}">
+        <p14:creationId xmlns:p14="http://schemas.microsoft.com/office/powerpoint/2010/main" val="1272269525"/>
+      </p:ext>
+    </p:extLst>
+  </p:cSld>
+  <p:clrMapOvr>
+    <a:masterClrMapping/>
+  </p:clrMapOvr>
+</p:sld>
+</file>
+
+<file path=ppt/slides/slide26.xml><?xml version="1.0" encoding="utf-8"?>
+<p:sld xmlns:a="http://schemas.openxmlformats.org/drawingml/2006/main" xmlns:r="http://schemas.openxmlformats.org/officeDocument/2006/relationships" xmlns:p="http://schemas.openxmlformats.org/presentationml/2006/main">
+  <p:cSld>
+    <p:bg>
+      <p:bgPr>
+        <a:blipFill dpi="0" rotWithShape="1">
+          <a:blip r:embed="rId3">
+            <a:alphaModFix amt="23000"/>
+            <a:lum/>
+          </a:blip>
+          <a:srcRect/>
+          <a:stretch>
+            <a:fillRect t="-1000" b="-1000"/>
+          </a:stretch>
+        </a:blipFill>
+        <a:effectLst/>
+      </p:bgPr>
+    </p:bg>
+    <p:spTree>
+      <p:nvGrpSpPr>
+        <p:cNvPr id="1" name=""/>
+        <p:cNvGrpSpPr/>
+        <p:nvPr/>
+      </p:nvGrpSpPr>
+      <p:grpSpPr>
+        <a:xfrm>
+          <a:off x="0" y="0"/>
+          <a:ext cx="0" cy="0"/>
+          <a:chOff x="0" y="0"/>
+          <a:chExt cx="0" cy="0"/>
+        </a:xfrm>
+      </p:grpSpPr>
+      <p:sp>
+        <p:nvSpPr>
+          <p:cNvPr id="7" name="Título 6">
+            <a:extLst>
+              <a:ext uri="{FF2B5EF4-FFF2-40B4-BE49-F238E27FC236}">
+                <a16:creationId xmlns:a16="http://schemas.microsoft.com/office/drawing/2014/main" id="{115AEDCA-5AC7-84A4-B996-B975D283F825}"/>
+              </a:ext>
+            </a:extLst>
+          </p:cNvPr>
+          <p:cNvSpPr>
+            <a:spLocks noGrp="1"/>
+          </p:cNvSpPr>
+          <p:nvPr>
+            <p:ph type="title"/>
+          </p:nvPr>
+        </p:nvSpPr>
+        <p:spPr>
+          <a:xfrm>
+            <a:off x="750651" y="3751501"/>
+            <a:ext cx="10515600" cy="1335147"/>
+          </a:xfrm>
+        </p:spPr>
+        <p:txBody>
+          <a:bodyPr>
+            <a:normAutofit fontScale="90000"/>
+          </a:bodyPr>
+          <a:lstStyle/>
+          <a:p>
+            <a:pPr algn="ctr"/>
+            <a:r>
+              <a:rPr lang="en-US" dirty="0"/>
+              <a:t>Las </a:t>
+            </a:r>
+            <a:r>
+              <a:rPr lang="en-US" dirty="0" err="1"/>
+              <a:t>preguntas</a:t>
+            </a:r>
+            <a:r>
+              <a:rPr lang="en-US" dirty="0"/>
+              <a:t>…</a:t>
+            </a:r>
+            <a:br>
+              <a:rPr lang="en-US" dirty="0"/>
+            </a:br>
+            <a:r>
+              <a:rPr lang="en-US" dirty="0"/>
+              <a:t>En </a:t>
+            </a:r>
+            <a:r>
+              <a:rPr lang="en-US" dirty="0" err="1"/>
+              <a:t>el</a:t>
+            </a:r>
+            <a:r>
+              <a:rPr lang="en-US" dirty="0"/>
+              <a:t> workshop.</a:t>
+            </a:r>
+            <a:br>
+              <a:rPr lang="en-US" dirty="0"/>
+            </a:br>
+            <a:br>
+              <a:rPr lang="en-US" dirty="0"/>
+            </a:br>
+            <a:r>
+              <a:rPr lang="en-US" sz="4000" dirty="0"/>
+              <a:t>https://github.com/martinpaurabe/PracticaQC.git</a:t>
+            </a:r>
+            <a:endParaRPr lang="es-ES" dirty="0"/>
+          </a:p>
+        </p:txBody>
+      </p:sp>
+      <p:sp>
+        <p:nvSpPr>
+          <p:cNvPr id="4" name="Marcador de número de diapositiva 3">
+            <a:extLst>
+              <a:ext uri="{FF2B5EF4-FFF2-40B4-BE49-F238E27FC236}">
+                <a16:creationId xmlns:a16="http://schemas.microsoft.com/office/drawing/2014/main" id="{2DC60E05-D5CF-2F33-ECCF-C77F3E20B961}"/>
+              </a:ext>
+            </a:extLst>
+          </p:cNvPr>
+          <p:cNvSpPr>
+            <a:spLocks noGrp="1"/>
+          </p:cNvSpPr>
+          <p:nvPr>
+            <p:ph type="sldNum" sz="quarter" idx="12"/>
+          </p:nvPr>
+        </p:nvSpPr>
+        <p:spPr/>
+        <p:txBody>
+          <a:bodyPr/>
+          <a:lstStyle/>
+          <a:p>
+            <a:fld id="{A2C3E7BB-DCAF-465F-9DB1-38B39D06FDD5}" type="slidenum">
+              <a:rPr lang="es-ES" smtClean="0"/>
+              <a:t>26</a:t>
+            </a:fld>
+            <a:endParaRPr lang="es-ES" dirty="0"/>
+          </a:p>
+        </p:txBody>
+      </p:sp>
+    </p:spTree>
+    <p:extLst>
+      <p:ext uri="{BB962C8B-B14F-4D97-AF65-F5344CB8AC3E}">
+        <p14:creationId xmlns:p14="http://schemas.microsoft.com/office/powerpoint/2010/main" val="2632946392"/>
+      </p:ext>
+    </p:extLst>
+  </p:cSld>
+  <p:clrMapOvr>
+    <a:masterClrMapping/>
+  </p:clrMapOvr>
+</p:sld>
+</file>
+
+<file path=ppt/slides/slide27.xml><?xml version="1.0" encoding="utf-8"?>
+<p:sld xmlns:a="http://schemas.openxmlformats.org/drawingml/2006/main" xmlns:r="http://schemas.openxmlformats.org/officeDocument/2006/relationships" xmlns:p="http://schemas.openxmlformats.org/presentationml/2006/main">
+  <p:cSld>
+    <p:bg>
+      <p:bgPr>
+        <a:blipFill dpi="0" rotWithShape="1">
+          <a:blip r:embed="rId3">
+            <a:alphaModFix amt="23000"/>
+            <a:lum/>
+          </a:blip>
+          <a:srcRect/>
+          <a:stretch>
+            <a:fillRect t="-1000" b="-1000"/>
+          </a:stretch>
+        </a:blipFill>
+        <a:effectLst/>
+      </p:bgPr>
+    </p:bg>
+    <p:spTree>
+      <p:nvGrpSpPr>
+        <p:cNvPr id="1" name=""/>
+        <p:cNvGrpSpPr/>
+        <p:nvPr/>
+      </p:nvGrpSpPr>
+      <p:grpSpPr>
+        <a:xfrm>
+          <a:off x="0" y="0"/>
+          <a:ext cx="0" cy="0"/>
+          <a:chOff x="0" y="0"/>
+          <a:chExt cx="0" cy="0"/>
+        </a:xfrm>
+      </p:grpSpPr>
+      <p:sp>
+        <p:nvSpPr>
           <p:cNvPr id="7" name="Título 6">
             <a:extLst>
               <a:ext uri="{FF2B5EF4-FFF2-40B4-BE49-F238E27FC236}">
@@ -16138,7 +17207,7 @@
           <a:p>
             <a:fld id="{A2C3E7BB-DCAF-465F-9DB1-38B39D06FDD5}" type="slidenum">
               <a:rPr lang="es-ES" smtClean="0"/>
-              <a:t>25</a:t>
+              <a:t>27</a:t>
             </a:fld>
             <a:endParaRPr lang="es-ES" dirty="0"/>
           </a:p>

</xml_diff>